<commit_message>
* Updates to report * Added presentation
</commit_message>
<xml_diff>
--- a/docs/presentation/CS598_DLH_GAT_Project_Team_GATors.pptx
+++ b/docs/presentation/CS598_DLH_GAT_Project_Team_GATors.pptx
@@ -5,22 +5,16 @@
     <p:sldMasterId id="2147484074" r:id="rId1"/>
   </p:sldMasterIdLst>
   <p:notesMasterIdLst>
-    <p:notesMasterId r:id="rId15"/>
+    <p:notesMasterId r:id="rId9"/>
   </p:notesMasterIdLst>
   <p:sldIdLst>
     <p:sldId id="256" r:id="rId2"/>
     <p:sldId id="261" r:id="rId3"/>
-    <p:sldId id="258" r:id="rId4"/>
-    <p:sldId id="264" r:id="rId5"/>
-    <p:sldId id="286" r:id="rId6"/>
-    <p:sldId id="288" r:id="rId7"/>
-    <p:sldId id="292" r:id="rId8"/>
-    <p:sldId id="290" r:id="rId9"/>
-    <p:sldId id="291" r:id="rId10"/>
-    <p:sldId id="293" r:id="rId11"/>
-    <p:sldId id="294" r:id="rId12"/>
-    <p:sldId id="295" r:id="rId13"/>
-    <p:sldId id="296" r:id="rId14"/>
+    <p:sldId id="297" r:id="rId4"/>
+    <p:sldId id="298" r:id="rId5"/>
+    <p:sldId id="299" r:id="rId6"/>
+    <p:sldId id="300" r:id="rId7"/>
+    <p:sldId id="301" r:id="rId8"/>
   </p:sldIdLst>
   <p:sldSz cx="12192000" cy="6858000"/>
   <p:notesSz cx="6858000" cy="9144000"/>
@@ -127,6 +121,22 @@
 </p:presentation>
 </file>
 
+<file path=ppt/authors.xml><?xml version="1.0" encoding="utf-8"?>
+<p188:authorLst xmlns:a="http://schemas.openxmlformats.org/drawingml/2006/main" xmlns:r="http://schemas.openxmlformats.org/officeDocument/2006/relationships" xmlns:p188="http://schemas.microsoft.com/office/powerpoint/2018/8/main">
+  <p188:author id="{4ACAACEA-7C5B-3DC7-363B-2EDC2FC86968}" name="Valle-Mena, Ruy" initials="VR" userId="S::rrv4@illinois.edu::a0445b2d-8ec1-4ce3-8c50-3f602ac81c26" providerId="AD"/>
+</p188:authorLst>
+</file>
+
+<file path=ppt/revisionInfo.xml><?xml version="1.0" encoding="utf-8"?>
+<p1510:revInfo xmlns:a="http://schemas.openxmlformats.org/drawingml/2006/main" xmlns:r="http://schemas.openxmlformats.org/officeDocument/2006/relationships" xmlns:p1510="http://schemas.microsoft.com/office/powerpoint/2015/10/main">
+  <p1510:revLst>
+    <p1510:client id="{4BB9B1B9-0734-5827-9C4F-AF063A3CEB1E}" v="1140" dt="2023-05-07T17:45:39.645"/>
+    <p1510:client id="{948E47BE-1958-43A1-BEEB-73FA679347C5}" v="401" dt="2023-04-30T19:34:40.969"/>
+    <p1510:client id="{C7D5824D-FE21-40A9-F575-BB8109094BF4}" v="741" dt="2023-05-06T19:00:48.376"/>
+  </p1510:revLst>
+</p1510:revInfo>
+</file>
+
 <file path=ppt/notesMasters/notesMaster1.xml><?xml version="1.0" encoding="utf-8"?>
 <p:notesMaster xmlns:a="http://schemas.openxmlformats.org/drawingml/2006/main" xmlns:r="http://schemas.openxmlformats.org/officeDocument/2006/relationships" xmlns:p="http://schemas.openxmlformats.org/presentationml/2006/main">
   <p:cSld>
@@ -209,7 +219,7 @@
           <a:p>
             <a:fld id="{53930D69-4E3D-1F4A-AE36-A96CABAF2F62}" type="datetimeFigureOut">
               <a:rPr lang="en-US" smtClean="0"/>
-              <a:t>4/28/23</a:t>
+              <a:t>5/7/2023</a:t>
             </a:fld>
             <a:endParaRPr lang="en-US"/>
           </a:p>
@@ -551,377 +561,6 @@
     <p:extLst>
       <p:ext uri="{BB962C8B-B14F-4D97-AF65-F5344CB8AC3E}">
         <p14:creationId xmlns:p14="http://schemas.microsoft.com/office/powerpoint/2010/main" val="793840991"/>
-      </p:ext>
-    </p:extLst>
-  </p:cSld>
-  <p:clrMapOvr>
-    <a:masterClrMapping/>
-  </p:clrMapOvr>
-</p:notes>
-</file>
-
-<file path=ppt/notesSlides/notesSlide2.xml><?xml version="1.0" encoding="utf-8"?>
-<p:notes xmlns:a="http://schemas.openxmlformats.org/drawingml/2006/main" xmlns:r="http://schemas.openxmlformats.org/officeDocument/2006/relationships" xmlns:p="http://schemas.openxmlformats.org/presentationml/2006/main">
-  <p:cSld>
-    <p:spTree>
-      <p:nvGrpSpPr>
-        <p:cNvPr id="1" name=""/>
-        <p:cNvGrpSpPr/>
-        <p:nvPr/>
-      </p:nvGrpSpPr>
-      <p:grpSpPr>
-        <a:xfrm>
-          <a:off x="0" y="0"/>
-          <a:ext cx="0" cy="0"/>
-          <a:chOff x="0" y="0"/>
-          <a:chExt cx="0" cy="0"/>
-        </a:xfrm>
-      </p:grpSpPr>
-      <p:sp>
-        <p:nvSpPr>
-          <p:cNvPr id="2" name="Slide Image Placeholder 1"/>
-          <p:cNvSpPr>
-            <a:spLocks noGrp="1" noRot="1" noChangeAspect="1"/>
-          </p:cNvSpPr>
-          <p:nvPr>
-            <p:ph type="sldImg"/>
-          </p:nvPr>
-        </p:nvSpPr>
-        <p:spPr/>
-      </p:sp>
-      <p:sp>
-        <p:nvSpPr>
-          <p:cNvPr id="3" name="Notes Placeholder 2"/>
-          <p:cNvSpPr>
-            <a:spLocks noGrp="1"/>
-          </p:cNvSpPr>
-          <p:nvPr>
-            <p:ph type="body" idx="1"/>
-          </p:nvPr>
-        </p:nvSpPr>
-        <p:spPr/>
-        <p:txBody>
-          <a:bodyPr/>
-          <a:lstStyle/>
-          <a:p>
-            <a:r>
-              <a:rPr lang="en-US" dirty="0"/>
-              <a:t>In our project, we explored different variants of the GAT model used in the paper. </a:t>
-            </a:r>
-          </a:p>
-          <a:p>
-            <a:r>
-              <a:rPr lang="en-US" dirty="0"/>
-              <a:t>We started by using the GAT model bundled with Pytorch Geometric, which was not flexible enough to follow the paper's methodology exactly. </a:t>
-            </a:r>
-          </a:p>
-          <a:p>
-            <a:r>
-              <a:rPr lang="en-US" dirty="0"/>
-              <a:t>However, this helped us understand how to feed the data into the model and set everything up. </a:t>
-            </a:r>
-          </a:p>
-          <a:p>
-            <a:r>
-              <a:rPr lang="en-US" dirty="0"/>
-              <a:t>We then aimed to build our own graph attention network implementation using Pytorch Geometric </a:t>
-            </a:r>
-            <a:r>
-              <a:rPr lang="en-US" dirty="0" err="1"/>
-              <a:t>GATConv</a:t>
-            </a:r>
-            <a:r>
-              <a:rPr lang="en-US" dirty="0"/>
-              <a:t> class, which allowed us to specify different activation functions at each layer. </a:t>
-            </a:r>
-          </a:p>
-          <a:p>
-            <a:r>
-              <a:rPr lang="en-US" dirty="0"/>
-              <a:t>Additionally, we attempted to rewrite GAT from scratch by following the mathematical description in the paper, but our implementation may be slower than existing ones.</a:t>
-            </a:r>
-          </a:p>
-        </p:txBody>
-      </p:sp>
-      <p:sp>
-        <p:nvSpPr>
-          <p:cNvPr id="4" name="Slide Number Placeholder 3"/>
-          <p:cNvSpPr>
-            <a:spLocks noGrp="1"/>
-          </p:cNvSpPr>
-          <p:nvPr>
-            <p:ph type="sldNum" sz="quarter" idx="5"/>
-          </p:nvPr>
-        </p:nvSpPr>
-        <p:spPr/>
-        <p:txBody>
-          <a:bodyPr/>
-          <a:lstStyle/>
-          <a:p>
-            <a:fld id="{20DB898B-AA12-B34F-98D6-3CFA80BE91E7}" type="slidenum">
-              <a:rPr lang="en-US" smtClean="0"/>
-              <a:t>10</a:t>
-            </a:fld>
-            <a:endParaRPr lang="en-US"/>
-          </a:p>
-        </p:txBody>
-      </p:sp>
-    </p:spTree>
-    <p:extLst>
-      <p:ext uri="{BB962C8B-B14F-4D97-AF65-F5344CB8AC3E}">
-        <p14:creationId xmlns:p14="http://schemas.microsoft.com/office/powerpoint/2010/main" val="2308400140"/>
-      </p:ext>
-    </p:extLst>
-  </p:cSld>
-  <p:clrMapOvr>
-    <a:masterClrMapping/>
-  </p:clrMapOvr>
-</p:notes>
-</file>
-
-<file path=ppt/notesSlides/notesSlide3.xml><?xml version="1.0" encoding="utf-8"?>
-<p:notes xmlns:a="http://schemas.openxmlformats.org/drawingml/2006/main" xmlns:r="http://schemas.openxmlformats.org/officeDocument/2006/relationships" xmlns:p="http://schemas.openxmlformats.org/presentationml/2006/main">
-  <p:cSld>
-    <p:spTree>
-      <p:nvGrpSpPr>
-        <p:cNvPr id="1" name=""/>
-        <p:cNvGrpSpPr/>
-        <p:nvPr/>
-      </p:nvGrpSpPr>
-      <p:grpSpPr>
-        <a:xfrm>
-          <a:off x="0" y="0"/>
-          <a:ext cx="0" cy="0"/>
-          <a:chOff x="0" y="0"/>
-          <a:chExt cx="0" cy="0"/>
-        </a:xfrm>
-      </p:grpSpPr>
-      <p:sp>
-        <p:nvSpPr>
-          <p:cNvPr id="2" name="Slide Image Placeholder 1"/>
-          <p:cNvSpPr>
-            <a:spLocks noGrp="1" noRot="1" noChangeAspect="1"/>
-          </p:cNvSpPr>
-          <p:nvPr>
-            <p:ph type="sldImg"/>
-          </p:nvPr>
-        </p:nvSpPr>
-        <p:spPr/>
-      </p:sp>
-      <p:sp>
-        <p:nvSpPr>
-          <p:cNvPr id="3" name="Notes Placeholder 2"/>
-          <p:cNvSpPr>
-            <a:spLocks noGrp="1"/>
-          </p:cNvSpPr>
-          <p:nvPr>
-            <p:ph type="body" idx="1"/>
-          </p:nvPr>
-        </p:nvSpPr>
-        <p:spPr/>
-        <p:txBody>
-          <a:bodyPr/>
-          <a:lstStyle/>
-          <a:p>
-            <a:endParaRPr lang="en-US" dirty="0"/>
-          </a:p>
-        </p:txBody>
-      </p:sp>
-      <p:sp>
-        <p:nvSpPr>
-          <p:cNvPr id="4" name="Slide Number Placeholder 3"/>
-          <p:cNvSpPr>
-            <a:spLocks noGrp="1"/>
-          </p:cNvSpPr>
-          <p:nvPr>
-            <p:ph type="sldNum" sz="quarter" idx="5"/>
-          </p:nvPr>
-        </p:nvSpPr>
-        <p:spPr/>
-        <p:txBody>
-          <a:bodyPr/>
-          <a:lstStyle/>
-          <a:p>
-            <a:fld id="{20DB898B-AA12-B34F-98D6-3CFA80BE91E7}" type="slidenum">
-              <a:rPr lang="en-US" smtClean="0"/>
-              <a:t>11</a:t>
-            </a:fld>
-            <a:endParaRPr lang="en-US"/>
-          </a:p>
-        </p:txBody>
-      </p:sp>
-    </p:spTree>
-    <p:extLst>
-      <p:ext uri="{BB962C8B-B14F-4D97-AF65-F5344CB8AC3E}">
-        <p14:creationId xmlns:p14="http://schemas.microsoft.com/office/powerpoint/2010/main" val="1558411227"/>
-      </p:ext>
-    </p:extLst>
-  </p:cSld>
-  <p:clrMapOvr>
-    <a:masterClrMapping/>
-  </p:clrMapOvr>
-</p:notes>
-</file>
-
-<file path=ppt/notesSlides/notesSlide4.xml><?xml version="1.0" encoding="utf-8"?>
-<p:notes xmlns:a="http://schemas.openxmlformats.org/drawingml/2006/main" xmlns:r="http://schemas.openxmlformats.org/officeDocument/2006/relationships" xmlns:p="http://schemas.openxmlformats.org/presentationml/2006/main">
-  <p:cSld>
-    <p:spTree>
-      <p:nvGrpSpPr>
-        <p:cNvPr id="1" name=""/>
-        <p:cNvGrpSpPr/>
-        <p:nvPr/>
-      </p:nvGrpSpPr>
-      <p:grpSpPr>
-        <a:xfrm>
-          <a:off x="0" y="0"/>
-          <a:ext cx="0" cy="0"/>
-          <a:chOff x="0" y="0"/>
-          <a:chExt cx="0" cy="0"/>
-        </a:xfrm>
-      </p:grpSpPr>
-      <p:sp>
-        <p:nvSpPr>
-          <p:cNvPr id="2" name="Slide Image Placeholder 1"/>
-          <p:cNvSpPr>
-            <a:spLocks noGrp="1" noRot="1" noChangeAspect="1"/>
-          </p:cNvSpPr>
-          <p:nvPr>
-            <p:ph type="sldImg"/>
-          </p:nvPr>
-        </p:nvSpPr>
-        <p:spPr/>
-      </p:sp>
-      <p:sp>
-        <p:nvSpPr>
-          <p:cNvPr id="3" name="Notes Placeholder 2"/>
-          <p:cNvSpPr>
-            <a:spLocks noGrp="1"/>
-          </p:cNvSpPr>
-          <p:nvPr>
-            <p:ph type="body" idx="1"/>
-          </p:nvPr>
-        </p:nvSpPr>
-        <p:spPr/>
-        <p:txBody>
-          <a:bodyPr/>
-          <a:lstStyle/>
-          <a:p>
-            <a:endParaRPr lang="en-US" dirty="0"/>
-          </a:p>
-        </p:txBody>
-      </p:sp>
-      <p:sp>
-        <p:nvSpPr>
-          <p:cNvPr id="4" name="Slide Number Placeholder 3"/>
-          <p:cNvSpPr>
-            <a:spLocks noGrp="1"/>
-          </p:cNvSpPr>
-          <p:nvPr>
-            <p:ph type="sldNum" sz="quarter" idx="5"/>
-          </p:nvPr>
-        </p:nvSpPr>
-        <p:spPr/>
-        <p:txBody>
-          <a:bodyPr/>
-          <a:lstStyle/>
-          <a:p>
-            <a:fld id="{20DB898B-AA12-B34F-98D6-3CFA80BE91E7}" type="slidenum">
-              <a:rPr lang="en-US" smtClean="0"/>
-              <a:t>12</a:t>
-            </a:fld>
-            <a:endParaRPr lang="en-US"/>
-          </a:p>
-        </p:txBody>
-      </p:sp>
-    </p:spTree>
-    <p:extLst>
-      <p:ext uri="{BB962C8B-B14F-4D97-AF65-F5344CB8AC3E}">
-        <p14:creationId xmlns:p14="http://schemas.microsoft.com/office/powerpoint/2010/main" val="3407014374"/>
-      </p:ext>
-    </p:extLst>
-  </p:cSld>
-  <p:clrMapOvr>
-    <a:masterClrMapping/>
-  </p:clrMapOvr>
-</p:notes>
-</file>
-
-<file path=ppt/notesSlides/notesSlide5.xml><?xml version="1.0" encoding="utf-8"?>
-<p:notes xmlns:a="http://schemas.openxmlformats.org/drawingml/2006/main" xmlns:r="http://schemas.openxmlformats.org/officeDocument/2006/relationships" xmlns:p="http://schemas.openxmlformats.org/presentationml/2006/main">
-  <p:cSld>
-    <p:spTree>
-      <p:nvGrpSpPr>
-        <p:cNvPr id="1" name=""/>
-        <p:cNvGrpSpPr/>
-        <p:nvPr/>
-      </p:nvGrpSpPr>
-      <p:grpSpPr>
-        <a:xfrm>
-          <a:off x="0" y="0"/>
-          <a:ext cx="0" cy="0"/>
-          <a:chOff x="0" y="0"/>
-          <a:chExt cx="0" cy="0"/>
-        </a:xfrm>
-      </p:grpSpPr>
-      <p:sp>
-        <p:nvSpPr>
-          <p:cNvPr id="2" name="Slide Image Placeholder 1"/>
-          <p:cNvSpPr>
-            <a:spLocks noGrp="1" noRot="1" noChangeAspect="1"/>
-          </p:cNvSpPr>
-          <p:nvPr>
-            <p:ph type="sldImg"/>
-          </p:nvPr>
-        </p:nvSpPr>
-        <p:spPr/>
-      </p:sp>
-      <p:sp>
-        <p:nvSpPr>
-          <p:cNvPr id="3" name="Notes Placeholder 2"/>
-          <p:cNvSpPr>
-            <a:spLocks noGrp="1"/>
-          </p:cNvSpPr>
-          <p:nvPr>
-            <p:ph type="body" idx="1"/>
-          </p:nvPr>
-        </p:nvSpPr>
-        <p:spPr/>
-        <p:txBody>
-          <a:bodyPr/>
-          <a:lstStyle/>
-          <a:p>
-            <a:endParaRPr lang="en-US" dirty="0"/>
-          </a:p>
-        </p:txBody>
-      </p:sp>
-      <p:sp>
-        <p:nvSpPr>
-          <p:cNvPr id="4" name="Slide Number Placeholder 3"/>
-          <p:cNvSpPr>
-            <a:spLocks noGrp="1"/>
-          </p:cNvSpPr>
-          <p:nvPr>
-            <p:ph type="sldNum" sz="quarter" idx="5"/>
-          </p:nvPr>
-        </p:nvSpPr>
-        <p:spPr/>
-        <p:txBody>
-          <a:bodyPr/>
-          <a:lstStyle/>
-          <a:p>
-            <a:fld id="{20DB898B-AA12-B34F-98D6-3CFA80BE91E7}" type="slidenum">
-              <a:rPr lang="en-US" smtClean="0"/>
-              <a:t>13</a:t>
-            </a:fld>
-            <a:endParaRPr lang="en-US"/>
-          </a:p>
-        </p:txBody>
-      </p:sp>
-    </p:spTree>
-    <p:extLst>
-      <p:ext uri="{BB962C8B-B14F-4D97-AF65-F5344CB8AC3E}">
-        <p14:creationId xmlns:p14="http://schemas.microsoft.com/office/powerpoint/2010/main" val="3326328263"/>
       </p:ext>
     </p:extLst>
   </p:cSld>
@@ -1432,7 +1071,7 @@
           <a:p>
             <a:fld id="{1353AD0F-BF97-3644-8E92-CEDB2A64071E}" type="datetime1">
               <a:rPr lang="en-US" smtClean="0"/>
-              <a:t>4/28/23</a:t>
+              <a:t>5/7/2023</a:t>
             </a:fld>
             <a:endParaRPr lang="en-US" dirty="0"/>
           </a:p>
@@ -1610,7 +1249,7 @@
           <a:p>
             <a:fld id="{BBD510CA-7EC4-0E47-9B1D-71F0D4D7FF20}" type="datetime1">
               <a:rPr lang="en-US" smtClean="0"/>
-              <a:t>4/28/23</a:t>
+              <a:t>5/7/2023</a:t>
             </a:fld>
             <a:endParaRPr lang="en-US" dirty="0"/>
           </a:p>
@@ -1791,7 +1430,7 @@
           <a:p>
             <a:fld id="{AAD4C12A-34FB-9044-B7A9-9082B5B1783D}" type="datetime1">
               <a:rPr lang="en-US" smtClean="0"/>
-              <a:t>4/28/23</a:t>
+              <a:t>5/7/2023</a:t>
             </a:fld>
             <a:endParaRPr lang="en-US" dirty="0"/>
           </a:p>
@@ -1962,7 +1601,7 @@
           <a:p>
             <a:fld id="{817E88AF-7664-794D-A7F7-285D9C8A1AAD}" type="datetime1">
               <a:rPr lang="en-US" smtClean="0"/>
-              <a:t>4/28/23</a:t>
+              <a:t>5/7/2023</a:t>
             </a:fld>
             <a:endParaRPr lang="en-US" dirty="0"/>
           </a:p>
@@ -2284,7 +1923,7 @@
           <a:p>
             <a:fld id="{BF298AC9-CEEE-1647-8215-AAF965D2F61E}" type="datetime1">
               <a:rPr lang="en-US" smtClean="0"/>
-              <a:t>4/28/23</a:t>
+              <a:t>5/7/2023</a:t>
             </a:fld>
             <a:endParaRPr lang="en-US" dirty="0"/>
           </a:p>
@@ -2745,7 +2384,7 @@
           <a:p>
             <a:fld id="{9A6E6A53-F230-384E-B032-0FB5E86C48F5}" type="datetime1">
               <a:rPr lang="en-US" smtClean="0"/>
-              <a:t>4/28/23</a:t>
+              <a:t>5/7/2023</a:t>
             </a:fld>
             <a:endParaRPr lang="en-US" dirty="0"/>
           </a:p>
@@ -3162,7 +2801,7 @@
           <a:p>
             <a:fld id="{5BE22943-D4F5-F94E-8D22-47B65A72B00F}" type="datetime1">
               <a:rPr lang="en-US" smtClean="0"/>
-              <a:t>4/28/23</a:t>
+              <a:t>5/7/2023</a:t>
             </a:fld>
             <a:endParaRPr lang="en-US" dirty="0"/>
           </a:p>
@@ -3286,7 +2925,7 @@
           <a:p>
             <a:fld id="{EEDFD4D5-5C3D-994D-B7DB-CD6FFC3560CE}" type="datetime1">
               <a:rPr lang="en-US" smtClean="0"/>
-              <a:t>4/28/23</a:t>
+              <a:t>5/7/2023</a:t>
             </a:fld>
             <a:endParaRPr lang="en-US" dirty="0"/>
           </a:p>
@@ -3404,7 +3043,7 @@
           <a:p>
             <a:fld id="{92E9D1BC-BB3F-474D-88BD-401E40AAADE4}" type="datetime1">
               <a:rPr lang="en-US" smtClean="0"/>
-              <a:t>4/28/23</a:t>
+              <a:t>5/7/2023</a:t>
             </a:fld>
             <a:endParaRPr lang="en-US" dirty="0"/>
           </a:p>
@@ -3763,7 +3402,7 @@
           <a:p>
             <a:fld id="{75B55B20-D564-1E46-90F3-50829AF2918E}" type="datetime1">
               <a:rPr lang="en-US" smtClean="0"/>
-              <a:t>4/28/23</a:t>
+              <a:t>5/7/2023</a:t>
             </a:fld>
             <a:endParaRPr lang="en-US" dirty="0"/>
           </a:p>
@@ -4276,7 +3915,7 @@
           <a:p>
             <a:fld id="{CE3FB352-5F24-CF46-BC98-5723BDCE3028}" type="datetime1">
               <a:rPr lang="en-US" smtClean="0"/>
-              <a:t>4/28/23</a:t>
+              <a:t>5/7/2023</a:t>
             </a:fld>
             <a:endParaRPr lang="en-US" dirty="0"/>
           </a:p>
@@ -4632,7 +4271,7 @@
           <a:p>
             <a:fld id="{712CD60C-35C5-014B-AB0A-2F5FD11617AB}" type="datetime1">
               <a:rPr lang="en-US" smtClean="0"/>
-              <a:t>4/28/23</a:t>
+              <a:t>5/7/2023</a:t>
             </a:fld>
             <a:endParaRPr lang="en-US" dirty="0"/>
           </a:p>
@@ -5480,14 +5119,21 @@
         </p:spPr>
         <p:txBody>
           <a:bodyPr vert="horz" lIns="91440" tIns="45720" rIns="91440" bIns="45720" rtlCol="0">
-            <a:normAutofit fontScale="90000"/>
+            <a:normAutofit/>
           </a:bodyPr>
           <a:lstStyle/>
           <a:p>
             <a:pPr algn="r"/>
             <a:r>
               <a:rPr lang="en-US" sz="6800" dirty="0"/>
-              <a:t>CS598 DLH Project: Reproduce and Experiment with Graph Attention Networks</a:t>
+              <a:t>CS598 DLH Project:</a:t>
+            </a:r>
+            <a:br>
+              <a:rPr lang="en-US" sz="6800" dirty="0"/>
+            </a:br>
+            <a:r>
+              <a:rPr lang="en-US" sz="6800" dirty="0"/>
+              <a:t>Graph Attention Networks</a:t>
             </a:r>
             <a:br>
               <a:rPr lang="en-US" sz="6800" dirty="0"/>
@@ -6177,1037 +5823,6 @@
 </p:sld>
 </file>
 
-<file path=ppt/slides/slide10.xml><?xml version="1.0" encoding="utf-8"?>
-<p:sld xmlns:a="http://schemas.openxmlformats.org/drawingml/2006/main" xmlns:r="http://schemas.openxmlformats.org/officeDocument/2006/relationships" xmlns:p="http://schemas.openxmlformats.org/presentationml/2006/main">
-  <p:cSld>
-    <p:spTree>
-      <p:nvGrpSpPr>
-        <p:cNvPr id="1" name=""/>
-        <p:cNvGrpSpPr/>
-        <p:nvPr/>
-      </p:nvGrpSpPr>
-      <p:grpSpPr>
-        <a:xfrm>
-          <a:off x="0" y="0"/>
-          <a:ext cx="0" cy="0"/>
-          <a:chOff x="0" y="0"/>
-          <a:chExt cx="0" cy="0"/>
-        </a:xfrm>
-      </p:grpSpPr>
-      <p:sp>
-        <p:nvSpPr>
-          <p:cNvPr id="2" name="Title 1">
-            <a:extLst>
-              <a:ext uri="{FF2B5EF4-FFF2-40B4-BE49-F238E27FC236}">
-                <a16:creationId xmlns:a16="http://schemas.microsoft.com/office/drawing/2014/main" id="{2166409C-8181-C8EB-4B9E-20A533ECA892}"/>
-              </a:ext>
-            </a:extLst>
-          </p:cNvPr>
-          <p:cNvSpPr>
-            <a:spLocks noGrp="1"/>
-          </p:cNvSpPr>
-          <p:nvPr>
-            <p:ph type="title"/>
-          </p:nvPr>
-        </p:nvSpPr>
-        <p:spPr>
-          <a:xfrm>
-            <a:off x="1069848" y="484632"/>
-            <a:ext cx="10058400" cy="1609344"/>
-          </a:xfrm>
-        </p:spPr>
-        <p:txBody>
-          <a:bodyPr>
-            <a:normAutofit/>
-          </a:bodyPr>
-          <a:lstStyle/>
-          <a:p>
-            <a:r>
-              <a:rPr lang="en-US" dirty="0"/>
-              <a:t>Reproducing &amp; experimenting GAT </a:t>
-            </a:r>
-            <a:br>
-              <a:rPr lang="en-US" dirty="0"/>
-            </a:br>
-            <a:r>
-              <a:rPr lang="en-US" dirty="0"/>
-              <a:t>- model implementation</a:t>
-            </a:r>
-          </a:p>
-        </p:txBody>
-      </p:sp>
-      <p:sp>
-        <p:nvSpPr>
-          <p:cNvPr id="42" name="Content Placeholder 2">
-            <a:extLst>
-              <a:ext uri="{FF2B5EF4-FFF2-40B4-BE49-F238E27FC236}">
-                <a16:creationId xmlns:a16="http://schemas.microsoft.com/office/drawing/2014/main" id="{1FD71070-A4EC-42D4-020D-ACA1B2467EA0}"/>
-              </a:ext>
-            </a:extLst>
-          </p:cNvPr>
-          <p:cNvSpPr>
-            <a:spLocks noGrp="1"/>
-          </p:cNvSpPr>
-          <p:nvPr>
-            <p:ph idx="1"/>
-          </p:nvPr>
-        </p:nvSpPr>
-        <p:spPr>
-          <a:xfrm>
-            <a:off x="1069847" y="2121408"/>
-            <a:ext cx="6482419" cy="4050792"/>
-          </a:xfrm>
-        </p:spPr>
-        <p:txBody>
-          <a:bodyPr>
-            <a:normAutofit fontScale="92500" lnSpcReduction="10000"/>
-          </a:bodyPr>
-          <a:lstStyle/>
-          <a:p>
-            <a:pPr marL="0" indent="0">
-              <a:buNone/>
-            </a:pPr>
-            <a:r>
-              <a:rPr lang="en-US" dirty="0"/>
-              <a:t>GAT Variants Explored in the Project:</a:t>
-            </a:r>
-          </a:p>
-          <a:p>
-            <a:pPr marL="457200" indent="-457200">
-              <a:buFont typeface="+mj-lt"/>
-              <a:buAutoNum type="arabicPeriod"/>
-            </a:pPr>
-            <a:r>
-              <a:rPr lang="en-US" sz="2000" dirty="0"/>
-              <a:t>GAT bundled with Pytorch Geometric: </a:t>
-            </a:r>
-          </a:p>
-          <a:p>
-            <a:pPr lvl="2"/>
-            <a:r>
-              <a:rPr lang="en-US" dirty="0"/>
-              <a:t>Tried to follow the paper's methodology, but not flexible enough</a:t>
-            </a:r>
-          </a:p>
-          <a:p>
-            <a:pPr marL="457200" indent="-457200">
-              <a:buFont typeface="+mj-lt"/>
-              <a:buAutoNum type="arabicPeriod"/>
-            </a:pPr>
-            <a:r>
-              <a:rPr lang="en-US" sz="2000" dirty="0"/>
-              <a:t>Pytorch Geometric </a:t>
-            </a:r>
-            <a:r>
-              <a:rPr lang="en-US" sz="2000" dirty="0" err="1"/>
-              <a:t>GATConv</a:t>
-            </a:r>
-            <a:r>
-              <a:rPr lang="en-US" sz="2000" dirty="0"/>
-              <a:t> class: </a:t>
-            </a:r>
-          </a:p>
-          <a:p>
-            <a:pPr lvl="2"/>
-            <a:r>
-              <a:rPr lang="en-US" dirty="0"/>
-              <a:t>Allows specifying different activation functions at each layer</a:t>
-            </a:r>
-          </a:p>
-          <a:p>
-            <a:pPr marL="457200" indent="-457200">
-              <a:buFont typeface="+mj-lt"/>
-              <a:buAutoNum type="arabicPeriod"/>
-            </a:pPr>
-            <a:r>
-              <a:rPr lang="en-US" sz="2000" dirty="0"/>
-              <a:t>Pytorch Geometric GATv2Conv class: </a:t>
-            </a:r>
-          </a:p>
-          <a:p>
-            <a:pPr lvl="2"/>
-            <a:r>
-              <a:rPr lang="en-US" dirty="0"/>
-              <a:t>more advanced; </a:t>
-            </a:r>
-          </a:p>
-          <a:p>
-            <a:pPr lvl="2"/>
-            <a:r>
-              <a:rPr lang="en-US" dirty="0"/>
-              <a:t>includes improvements to its architecture and implementation</a:t>
-            </a:r>
-          </a:p>
-          <a:p>
-            <a:pPr lvl="2"/>
-            <a:r>
-              <a:rPr lang="en-US" dirty="0"/>
-              <a:t>more computationally expensive </a:t>
-            </a:r>
-          </a:p>
-          <a:p>
-            <a:pPr lvl="2"/>
-            <a:r>
-              <a:rPr lang="en-US" dirty="0"/>
-              <a:t>difficult to train than the original </a:t>
-            </a:r>
-            <a:r>
-              <a:rPr lang="en-US" dirty="0" err="1"/>
-              <a:t>GATConv</a:t>
-            </a:r>
-            <a:endParaRPr lang="en-US" dirty="0"/>
-          </a:p>
-          <a:p>
-            <a:pPr marL="457200" indent="-457200">
-              <a:buFont typeface="+mj-lt"/>
-              <a:buAutoNum type="arabicPeriod"/>
-            </a:pPr>
-            <a:r>
-              <a:rPr lang="en-US" sz="2000" dirty="0"/>
-              <a:t>Rewriting GAT from scratch: </a:t>
-            </a:r>
-          </a:p>
-          <a:p>
-            <a:pPr lvl="2"/>
-            <a:r>
-              <a:rPr lang="en-US" dirty="0"/>
-              <a:t>Followed mathematical description in the paper, but slower implementation</a:t>
-            </a:r>
-          </a:p>
-        </p:txBody>
-      </p:sp>
-      <p:sp>
-        <p:nvSpPr>
-          <p:cNvPr id="6" name="Slide Number Placeholder 5">
-            <a:extLst>
-              <a:ext uri="{FF2B5EF4-FFF2-40B4-BE49-F238E27FC236}">
-                <a16:creationId xmlns:a16="http://schemas.microsoft.com/office/drawing/2014/main" id="{A3E3E713-A070-42E3-60AF-E2F15FFACBEC}"/>
-              </a:ext>
-            </a:extLst>
-          </p:cNvPr>
-          <p:cNvSpPr>
-            <a:spLocks noGrp="1"/>
-          </p:cNvSpPr>
-          <p:nvPr>
-            <p:ph type="sldNum" sz="quarter" idx="12"/>
-          </p:nvPr>
-        </p:nvSpPr>
-        <p:spPr>
-          <a:xfrm>
-            <a:off x="11311128" y="6272784"/>
-            <a:ext cx="640080" cy="365125"/>
-          </a:xfrm>
-        </p:spPr>
-        <p:txBody>
-          <a:bodyPr>
-            <a:normAutofit/>
-          </a:bodyPr>
-          <a:lstStyle/>
-          <a:p>
-            <a:pPr>
-              <a:spcAft>
-                <a:spcPts val="600"/>
-              </a:spcAft>
-            </a:pPr>
-            <a:fld id="{D57F1E4F-1CFF-5643-939E-217C01CDF565}" type="slidenum">
-              <a:rPr lang="en-US" smtClean="0"/>
-              <a:pPr>
-                <a:spcAft>
-                  <a:spcPts val="600"/>
-                </a:spcAft>
-              </a:pPr>
-              <a:t>10</a:t>
-            </a:fld>
-            <a:endParaRPr lang="en-US"/>
-          </a:p>
-        </p:txBody>
-      </p:sp>
-      <p:pic>
-        <p:nvPicPr>
-          <p:cNvPr id="3" name="Picture 2" descr="Illuminated server room panel">
-            <a:extLst>
-              <a:ext uri="{FF2B5EF4-FFF2-40B4-BE49-F238E27FC236}">
-                <a16:creationId xmlns:a16="http://schemas.microsoft.com/office/drawing/2014/main" id="{BD85E323-E740-307F-E3DA-5159B4755561}"/>
-              </a:ext>
-            </a:extLst>
-          </p:cNvPr>
-          <p:cNvPicPr>
-            <a:picLocks noChangeAspect="1"/>
-          </p:cNvPicPr>
-          <p:nvPr/>
-        </p:nvPicPr>
-        <p:blipFill>
-          <a:blip r:embed="rId3"/>
-          <a:srcRect l="20157" r="20157"/>
-          <a:stretch/>
-        </p:blipFill>
-        <p:spPr>
-          <a:xfrm>
-            <a:off x="7872307" y="2193036"/>
-            <a:ext cx="3261974" cy="3639872"/>
-          </a:xfrm>
-          <a:prstGeom prst="rect">
-            <a:avLst/>
-          </a:prstGeom>
-        </p:spPr>
-      </p:pic>
-    </p:spTree>
-    <p:extLst>
-      <p:ext uri="{BB962C8B-B14F-4D97-AF65-F5344CB8AC3E}">
-        <p14:creationId xmlns:p14="http://schemas.microsoft.com/office/powerpoint/2010/main" val="507434265"/>
-      </p:ext>
-    </p:extLst>
-  </p:cSld>
-  <p:clrMapOvr>
-    <a:masterClrMapping/>
-  </p:clrMapOvr>
-</p:sld>
-</file>
-
-<file path=ppt/slides/slide11.xml><?xml version="1.0" encoding="utf-8"?>
-<p:sld xmlns:a="http://schemas.openxmlformats.org/drawingml/2006/main" xmlns:r="http://schemas.openxmlformats.org/officeDocument/2006/relationships" xmlns:p="http://schemas.openxmlformats.org/presentationml/2006/main">
-  <p:cSld>
-    <p:spTree>
-      <p:nvGrpSpPr>
-        <p:cNvPr id="1" name=""/>
-        <p:cNvGrpSpPr/>
-        <p:nvPr/>
-      </p:nvGrpSpPr>
-      <p:grpSpPr>
-        <a:xfrm>
-          <a:off x="0" y="0"/>
-          <a:ext cx="0" cy="0"/>
-          <a:chOff x="0" y="0"/>
-          <a:chExt cx="0" cy="0"/>
-        </a:xfrm>
-      </p:grpSpPr>
-      <p:sp>
-        <p:nvSpPr>
-          <p:cNvPr id="2" name="Title 1">
-            <a:extLst>
-              <a:ext uri="{FF2B5EF4-FFF2-40B4-BE49-F238E27FC236}">
-                <a16:creationId xmlns:a16="http://schemas.microsoft.com/office/drawing/2014/main" id="{2166409C-8181-C8EB-4B9E-20A533ECA892}"/>
-              </a:ext>
-            </a:extLst>
-          </p:cNvPr>
-          <p:cNvSpPr>
-            <a:spLocks noGrp="1"/>
-          </p:cNvSpPr>
-          <p:nvPr>
-            <p:ph type="title"/>
-          </p:nvPr>
-        </p:nvSpPr>
-        <p:spPr>
-          <a:xfrm>
-            <a:off x="1069848" y="484632"/>
-            <a:ext cx="10058400" cy="1609344"/>
-          </a:xfrm>
-        </p:spPr>
-        <p:txBody>
-          <a:bodyPr>
-            <a:normAutofit/>
-          </a:bodyPr>
-          <a:lstStyle/>
-          <a:p>
-            <a:r>
-              <a:rPr lang="en-US" dirty="0"/>
-              <a:t>Reproducing &amp; experimenting GAT </a:t>
-            </a:r>
-            <a:br>
-              <a:rPr lang="en-US" dirty="0"/>
-            </a:br>
-            <a:r>
-              <a:rPr lang="en-US" dirty="0"/>
-              <a:t>- computational requirements</a:t>
-            </a:r>
-          </a:p>
-        </p:txBody>
-      </p:sp>
-      <p:sp>
-        <p:nvSpPr>
-          <p:cNvPr id="42" name="Content Placeholder 2">
-            <a:extLst>
-              <a:ext uri="{FF2B5EF4-FFF2-40B4-BE49-F238E27FC236}">
-                <a16:creationId xmlns:a16="http://schemas.microsoft.com/office/drawing/2014/main" id="{1FD71070-A4EC-42D4-020D-ACA1B2467EA0}"/>
-              </a:ext>
-            </a:extLst>
-          </p:cNvPr>
-          <p:cNvSpPr>
-            <a:spLocks noGrp="1"/>
-          </p:cNvSpPr>
-          <p:nvPr>
-            <p:ph idx="1"/>
-          </p:nvPr>
-        </p:nvSpPr>
-        <p:spPr>
-          <a:xfrm>
-            <a:off x="1069847" y="2121408"/>
-            <a:ext cx="6482419" cy="4050792"/>
-          </a:xfrm>
-        </p:spPr>
-        <p:txBody>
-          <a:bodyPr>
-            <a:normAutofit/>
-          </a:bodyPr>
-          <a:lstStyle/>
-          <a:p>
-            <a:pPr marL="0" indent="0">
-              <a:buNone/>
-            </a:pPr>
-            <a:r>
-              <a:rPr lang="en-US" dirty="0"/>
-              <a:t>To implement the GAT model and reproduce its results using </a:t>
-            </a:r>
-            <a:r>
-              <a:rPr lang="en-US" dirty="0" err="1"/>
-              <a:t>PyTorch</a:t>
-            </a:r>
-            <a:r>
-              <a:rPr lang="en-US" dirty="0"/>
-              <a:t> version 1.9.0 on two platforms.</a:t>
-            </a:r>
-          </a:p>
-          <a:p>
-            <a:pPr>
-              <a:buFont typeface="Arial" panose="020B0604020202020204" pitchFamily="34" charset="0"/>
-              <a:buChar char="•"/>
-            </a:pPr>
-            <a:r>
-              <a:rPr lang="en-US" dirty="0"/>
-              <a:t>Two local systems: a </a:t>
-            </a:r>
-            <a:r>
-              <a:rPr lang="en-US" dirty="0" err="1"/>
-              <a:t>Macbook</a:t>
-            </a:r>
-            <a:r>
-              <a:rPr lang="en-US" dirty="0"/>
-              <a:t> and a Windows with an Intel Core i7 CPU, 16GB RAM, and Intel UHD GPU.</a:t>
-            </a:r>
-          </a:p>
-          <a:p>
-            <a:pPr>
-              <a:buFont typeface="Arial" panose="020B0604020202020204" pitchFamily="34" charset="0"/>
-              <a:buChar char="•"/>
-            </a:pPr>
-            <a:r>
-              <a:rPr lang="en-US" dirty="0"/>
-              <a:t>Google </a:t>
-            </a:r>
-            <a:r>
-              <a:rPr lang="en-US" dirty="0" err="1"/>
-              <a:t>Colab's</a:t>
-            </a:r>
-            <a:r>
-              <a:rPr lang="en-US" dirty="0"/>
-              <a:t> free GPU instance with 12GB of RAM.</a:t>
-            </a:r>
-          </a:p>
-          <a:p>
-            <a:r>
-              <a:rPr lang="en-US" dirty="0" err="1"/>
-              <a:t>PyTorch</a:t>
-            </a:r>
-            <a:r>
-              <a:rPr lang="en-US" dirty="0"/>
-              <a:t> and necessary dependencies installed using pip package manager on the local system, and within the Google </a:t>
-            </a:r>
-            <a:r>
-              <a:rPr lang="en-US" dirty="0" err="1"/>
-              <a:t>Colab</a:t>
-            </a:r>
-            <a:r>
-              <a:rPr lang="en-US" dirty="0"/>
-              <a:t> notebook environment.</a:t>
-            </a:r>
-          </a:p>
-        </p:txBody>
-      </p:sp>
-      <p:sp>
-        <p:nvSpPr>
-          <p:cNvPr id="6" name="Slide Number Placeholder 5">
-            <a:extLst>
-              <a:ext uri="{FF2B5EF4-FFF2-40B4-BE49-F238E27FC236}">
-                <a16:creationId xmlns:a16="http://schemas.microsoft.com/office/drawing/2014/main" id="{A3E3E713-A070-42E3-60AF-E2F15FFACBEC}"/>
-              </a:ext>
-            </a:extLst>
-          </p:cNvPr>
-          <p:cNvSpPr>
-            <a:spLocks noGrp="1"/>
-          </p:cNvSpPr>
-          <p:nvPr>
-            <p:ph type="sldNum" sz="quarter" idx="12"/>
-          </p:nvPr>
-        </p:nvSpPr>
-        <p:spPr>
-          <a:xfrm>
-            <a:off x="11311128" y="6272784"/>
-            <a:ext cx="640080" cy="365125"/>
-          </a:xfrm>
-        </p:spPr>
-        <p:txBody>
-          <a:bodyPr>
-            <a:normAutofit/>
-          </a:bodyPr>
-          <a:lstStyle/>
-          <a:p>
-            <a:pPr>
-              <a:spcAft>
-                <a:spcPts val="600"/>
-              </a:spcAft>
-            </a:pPr>
-            <a:fld id="{D57F1E4F-1CFF-5643-939E-217C01CDF565}" type="slidenum">
-              <a:rPr lang="en-US" smtClean="0"/>
-              <a:pPr>
-                <a:spcAft>
-                  <a:spcPts val="600"/>
-                </a:spcAft>
-              </a:pPr>
-              <a:t>11</a:t>
-            </a:fld>
-            <a:endParaRPr lang="en-US"/>
-          </a:p>
-        </p:txBody>
-      </p:sp>
-      <p:pic>
-        <p:nvPicPr>
-          <p:cNvPr id="3" name="Picture 2" descr="Illuminated server room panel">
-            <a:extLst>
-              <a:ext uri="{FF2B5EF4-FFF2-40B4-BE49-F238E27FC236}">
-                <a16:creationId xmlns:a16="http://schemas.microsoft.com/office/drawing/2014/main" id="{BD85E323-E740-307F-E3DA-5159B4755561}"/>
-              </a:ext>
-            </a:extLst>
-          </p:cNvPr>
-          <p:cNvPicPr>
-            <a:picLocks noChangeAspect="1"/>
-          </p:cNvPicPr>
-          <p:nvPr/>
-        </p:nvPicPr>
-        <p:blipFill>
-          <a:blip r:embed="rId3"/>
-          <a:srcRect l="20157" r="20157"/>
-          <a:stretch/>
-        </p:blipFill>
-        <p:spPr>
-          <a:xfrm>
-            <a:off x="7872307" y="2193036"/>
-            <a:ext cx="3261974" cy="3639872"/>
-          </a:xfrm>
-          <a:prstGeom prst="rect">
-            <a:avLst/>
-          </a:prstGeom>
-        </p:spPr>
-      </p:pic>
-    </p:spTree>
-    <p:extLst>
-      <p:ext uri="{BB962C8B-B14F-4D97-AF65-F5344CB8AC3E}">
-        <p14:creationId xmlns:p14="http://schemas.microsoft.com/office/powerpoint/2010/main" val="1518324023"/>
-      </p:ext>
-    </p:extLst>
-  </p:cSld>
-  <p:clrMapOvr>
-    <a:masterClrMapping/>
-  </p:clrMapOvr>
-</p:sld>
-</file>
-
-<file path=ppt/slides/slide12.xml><?xml version="1.0" encoding="utf-8"?>
-<p:sld xmlns:a="http://schemas.openxmlformats.org/drawingml/2006/main" xmlns:r="http://schemas.openxmlformats.org/officeDocument/2006/relationships" xmlns:p="http://schemas.openxmlformats.org/presentationml/2006/main">
-  <p:cSld>
-    <p:spTree>
-      <p:nvGrpSpPr>
-        <p:cNvPr id="1" name=""/>
-        <p:cNvGrpSpPr/>
-        <p:nvPr/>
-      </p:nvGrpSpPr>
-      <p:grpSpPr>
-        <a:xfrm>
-          <a:off x="0" y="0"/>
-          <a:ext cx="0" cy="0"/>
-          <a:chOff x="0" y="0"/>
-          <a:chExt cx="0" cy="0"/>
-        </a:xfrm>
-      </p:grpSpPr>
-      <p:sp>
-        <p:nvSpPr>
-          <p:cNvPr id="2" name="Title 1">
-            <a:extLst>
-              <a:ext uri="{FF2B5EF4-FFF2-40B4-BE49-F238E27FC236}">
-                <a16:creationId xmlns:a16="http://schemas.microsoft.com/office/drawing/2014/main" id="{2166409C-8181-C8EB-4B9E-20A533ECA892}"/>
-              </a:ext>
-            </a:extLst>
-          </p:cNvPr>
-          <p:cNvSpPr>
-            <a:spLocks noGrp="1"/>
-          </p:cNvSpPr>
-          <p:nvPr>
-            <p:ph type="title"/>
-          </p:nvPr>
-        </p:nvSpPr>
-        <p:spPr>
-          <a:xfrm>
-            <a:off x="1069848" y="484632"/>
-            <a:ext cx="10058400" cy="1609344"/>
-          </a:xfrm>
-        </p:spPr>
-        <p:txBody>
-          <a:bodyPr>
-            <a:normAutofit/>
-          </a:bodyPr>
-          <a:lstStyle/>
-          <a:p>
-            <a:r>
-              <a:rPr lang="en-US" dirty="0"/>
-              <a:t>Reproducing &amp; experimenting GAT </a:t>
-            </a:r>
-            <a:br>
-              <a:rPr lang="en-US" dirty="0"/>
-            </a:br>
-            <a:r>
-              <a:rPr lang="en-US" dirty="0"/>
-              <a:t>- findings &amp; RESULTS</a:t>
-            </a:r>
-          </a:p>
-        </p:txBody>
-      </p:sp>
-      <p:sp>
-        <p:nvSpPr>
-          <p:cNvPr id="42" name="Content Placeholder 2">
-            <a:extLst>
-              <a:ext uri="{FF2B5EF4-FFF2-40B4-BE49-F238E27FC236}">
-                <a16:creationId xmlns:a16="http://schemas.microsoft.com/office/drawing/2014/main" id="{1FD71070-A4EC-42D4-020D-ACA1B2467EA0}"/>
-              </a:ext>
-            </a:extLst>
-          </p:cNvPr>
-          <p:cNvSpPr>
-            <a:spLocks noGrp="1"/>
-          </p:cNvSpPr>
-          <p:nvPr>
-            <p:ph idx="1"/>
-          </p:nvPr>
-        </p:nvSpPr>
-        <p:spPr>
-          <a:xfrm>
-            <a:off x="1069847" y="2121408"/>
-            <a:ext cx="6482419" cy="4050792"/>
-          </a:xfrm>
-        </p:spPr>
-        <p:txBody>
-          <a:bodyPr>
-            <a:normAutofit fontScale="77500" lnSpcReduction="20000"/>
-          </a:bodyPr>
-          <a:lstStyle/>
-          <a:p>
-            <a:pPr>
-              <a:buFont typeface="Arial" panose="020B0604020202020204" pitchFamily="34" charset="0"/>
-              <a:buChar char="•"/>
-            </a:pPr>
-            <a:r>
-              <a:rPr lang="en-US" dirty="0"/>
-              <a:t>Pytorch Geometric GAT implementation not flexible enough to exactly replicate paper's experiments</a:t>
-            </a:r>
-          </a:p>
-          <a:p>
-            <a:pPr>
-              <a:buFont typeface="Arial" panose="020B0604020202020204" pitchFamily="34" charset="0"/>
-              <a:buChar char="•"/>
-            </a:pPr>
-            <a:r>
-              <a:rPr lang="en-US" dirty="0"/>
-              <a:t>Preliminary results are encouraging.</a:t>
-            </a:r>
-          </a:p>
-          <a:p>
-            <a:pPr>
-              <a:buFont typeface="Arial" panose="020B0604020202020204" pitchFamily="34" charset="0"/>
-              <a:buChar char="•"/>
-            </a:pPr>
-            <a:r>
-              <a:rPr lang="en-US" dirty="0"/>
-              <a:t>Training accuracy reaches 100% on Citeseer, Cora, and Pubmed datasets.</a:t>
-            </a:r>
-          </a:p>
-          <a:p>
-            <a:pPr>
-              <a:buFont typeface="Arial" panose="020B0604020202020204" pitchFamily="34" charset="0"/>
-              <a:buChar char="•"/>
-            </a:pPr>
-            <a:r>
-              <a:rPr lang="en-US" dirty="0"/>
-              <a:t>Training the model on PPI dataset is significantly slower than on other datasets.</a:t>
-            </a:r>
-          </a:p>
-          <a:p>
-            <a:pPr>
-              <a:buFont typeface="Arial" panose="020B0604020202020204" pitchFamily="34" charset="0"/>
-              <a:buChar char="•"/>
-            </a:pPr>
-            <a:r>
-              <a:rPr lang="en-US" dirty="0"/>
-              <a:t>Test accuracy on Pubmed dataset is essentially indistinguishable from paper's results</a:t>
-            </a:r>
-          </a:p>
-          <a:p>
-            <a:pPr>
-              <a:buFont typeface="Arial" panose="020B0604020202020204" pitchFamily="34" charset="0"/>
-              <a:buChar char="•"/>
-            </a:pPr>
-            <a:r>
-              <a:rPr lang="en-US" dirty="0"/>
-              <a:t>Test accuracy on Citeseer and Cora datasets are about 5% worse than paper's results</a:t>
-            </a:r>
-          </a:p>
-          <a:p>
-            <a:pPr>
-              <a:buFont typeface="Arial" panose="020B0604020202020204" pitchFamily="34" charset="0"/>
-              <a:buChar char="•"/>
-            </a:pPr>
-            <a:r>
-              <a:rPr lang="en-US" dirty="0"/>
-              <a:t>Results for PPI dataset are reported on training set, achieving a micro-averaged F1 score of 0.374 after 71 epochs.</a:t>
-            </a:r>
-          </a:p>
-          <a:p>
-            <a:pPr>
-              <a:buFont typeface="Arial" panose="020B0604020202020204" pitchFamily="34" charset="0"/>
-              <a:buChar char="•"/>
-            </a:pPr>
-            <a:r>
-              <a:rPr lang="en-US" dirty="0"/>
-              <a:t>Results for other datasets are accuracy scores on test set after 200 epochs of training</a:t>
-            </a:r>
-          </a:p>
-          <a:p>
-            <a:pPr>
-              <a:buFont typeface="Arial" panose="020B0604020202020204" pitchFamily="34" charset="0"/>
-              <a:buChar char="•"/>
-            </a:pPr>
-            <a:r>
-              <a:rPr lang="en-US" dirty="0"/>
-              <a:t>Signs of overfitting observed in experiments</a:t>
-            </a:r>
-          </a:p>
-          <a:p>
-            <a:pPr>
-              <a:buFont typeface="Arial" panose="020B0604020202020204" pitchFamily="34" charset="0"/>
-              <a:buChar char="•"/>
-            </a:pPr>
-            <a:endParaRPr lang="en-US" dirty="0"/>
-          </a:p>
-        </p:txBody>
-      </p:sp>
-      <p:sp>
-        <p:nvSpPr>
-          <p:cNvPr id="6" name="Slide Number Placeholder 5">
-            <a:extLst>
-              <a:ext uri="{FF2B5EF4-FFF2-40B4-BE49-F238E27FC236}">
-                <a16:creationId xmlns:a16="http://schemas.microsoft.com/office/drawing/2014/main" id="{A3E3E713-A070-42E3-60AF-E2F15FFACBEC}"/>
-              </a:ext>
-            </a:extLst>
-          </p:cNvPr>
-          <p:cNvSpPr>
-            <a:spLocks noGrp="1"/>
-          </p:cNvSpPr>
-          <p:nvPr>
-            <p:ph type="sldNum" sz="quarter" idx="12"/>
-          </p:nvPr>
-        </p:nvSpPr>
-        <p:spPr>
-          <a:xfrm>
-            <a:off x="11311128" y="6272784"/>
-            <a:ext cx="640080" cy="365125"/>
-          </a:xfrm>
-        </p:spPr>
-        <p:txBody>
-          <a:bodyPr>
-            <a:normAutofit/>
-          </a:bodyPr>
-          <a:lstStyle/>
-          <a:p>
-            <a:pPr>
-              <a:spcAft>
-                <a:spcPts val="600"/>
-              </a:spcAft>
-            </a:pPr>
-            <a:fld id="{D57F1E4F-1CFF-5643-939E-217C01CDF565}" type="slidenum">
-              <a:rPr lang="en-US" smtClean="0"/>
-              <a:pPr>
-                <a:spcAft>
-                  <a:spcPts val="600"/>
-                </a:spcAft>
-              </a:pPr>
-              <a:t>12</a:t>
-            </a:fld>
-            <a:endParaRPr lang="en-US"/>
-          </a:p>
-        </p:txBody>
-      </p:sp>
-      <p:pic>
-        <p:nvPicPr>
-          <p:cNvPr id="3" name="Picture 2">
-            <a:extLst>
-              <a:ext uri="{FF2B5EF4-FFF2-40B4-BE49-F238E27FC236}">
-                <a16:creationId xmlns:a16="http://schemas.microsoft.com/office/drawing/2014/main" id="{BD85E323-E740-307F-E3DA-5159B4755561}"/>
-              </a:ext>
-            </a:extLst>
-          </p:cNvPr>
-          <p:cNvPicPr>
-            <a:picLocks noChangeAspect="1"/>
-          </p:cNvPicPr>
-          <p:nvPr/>
-        </p:nvPicPr>
-        <p:blipFill rotWithShape="1">
-          <a:blip r:embed="rId3"/>
-          <a:srcRect t="-102439" b="-102439"/>
-          <a:stretch/>
-        </p:blipFill>
-        <p:spPr>
-          <a:xfrm>
-            <a:off x="7872307" y="2193036"/>
-            <a:ext cx="3261974" cy="3639872"/>
-          </a:xfrm>
-          <a:prstGeom prst="rect">
-            <a:avLst/>
-          </a:prstGeom>
-        </p:spPr>
-      </p:pic>
-    </p:spTree>
-    <p:extLst>
-      <p:ext uri="{BB962C8B-B14F-4D97-AF65-F5344CB8AC3E}">
-        <p14:creationId xmlns:p14="http://schemas.microsoft.com/office/powerpoint/2010/main" val="4186868840"/>
-      </p:ext>
-    </p:extLst>
-  </p:cSld>
-  <p:clrMapOvr>
-    <a:masterClrMapping/>
-  </p:clrMapOvr>
-</p:sld>
-</file>
-
-<file path=ppt/slides/slide13.xml><?xml version="1.0" encoding="utf-8"?>
-<p:sld xmlns:a="http://schemas.openxmlformats.org/drawingml/2006/main" xmlns:r="http://schemas.openxmlformats.org/officeDocument/2006/relationships" xmlns:p="http://schemas.openxmlformats.org/presentationml/2006/main">
-  <p:cSld>
-    <p:spTree>
-      <p:nvGrpSpPr>
-        <p:cNvPr id="1" name=""/>
-        <p:cNvGrpSpPr/>
-        <p:nvPr/>
-      </p:nvGrpSpPr>
-      <p:grpSpPr>
-        <a:xfrm>
-          <a:off x="0" y="0"/>
-          <a:ext cx="0" cy="0"/>
-          <a:chOff x="0" y="0"/>
-          <a:chExt cx="0" cy="0"/>
-        </a:xfrm>
-      </p:grpSpPr>
-      <p:sp>
-        <p:nvSpPr>
-          <p:cNvPr id="2" name="Title 1">
-            <a:extLst>
-              <a:ext uri="{FF2B5EF4-FFF2-40B4-BE49-F238E27FC236}">
-                <a16:creationId xmlns:a16="http://schemas.microsoft.com/office/drawing/2014/main" id="{2166409C-8181-C8EB-4B9E-20A533ECA892}"/>
-              </a:ext>
-            </a:extLst>
-          </p:cNvPr>
-          <p:cNvSpPr>
-            <a:spLocks noGrp="1"/>
-          </p:cNvSpPr>
-          <p:nvPr>
-            <p:ph type="title"/>
-          </p:nvPr>
-        </p:nvSpPr>
-        <p:spPr>
-          <a:xfrm>
-            <a:off x="1069848" y="484632"/>
-            <a:ext cx="10058400" cy="1609344"/>
-          </a:xfrm>
-        </p:spPr>
-        <p:txBody>
-          <a:bodyPr>
-            <a:normAutofit/>
-          </a:bodyPr>
-          <a:lstStyle/>
-          <a:p>
-            <a:r>
-              <a:rPr lang="en-US" dirty="0"/>
-              <a:t>Reproducing &amp; experimenting GAT </a:t>
-            </a:r>
-            <a:br>
-              <a:rPr lang="en-US" dirty="0"/>
-            </a:br>
-            <a:r>
-              <a:rPr lang="en-US" dirty="0"/>
-              <a:t>- conclusion &amp; future works</a:t>
-            </a:r>
-          </a:p>
-        </p:txBody>
-      </p:sp>
-      <p:sp>
-        <p:nvSpPr>
-          <p:cNvPr id="42" name="Content Placeholder 2">
-            <a:extLst>
-              <a:ext uri="{FF2B5EF4-FFF2-40B4-BE49-F238E27FC236}">
-                <a16:creationId xmlns:a16="http://schemas.microsoft.com/office/drawing/2014/main" id="{1FD71070-A4EC-42D4-020D-ACA1B2467EA0}"/>
-              </a:ext>
-            </a:extLst>
-          </p:cNvPr>
-          <p:cNvSpPr>
-            <a:spLocks noGrp="1"/>
-          </p:cNvSpPr>
-          <p:nvPr>
-            <p:ph idx="1"/>
-          </p:nvPr>
-        </p:nvSpPr>
-        <p:spPr>
-          <a:xfrm>
-            <a:off x="1069847" y="2121408"/>
-            <a:ext cx="6482419" cy="4050792"/>
-          </a:xfrm>
-        </p:spPr>
-        <p:txBody>
-          <a:bodyPr>
-            <a:normAutofit/>
-          </a:bodyPr>
-          <a:lstStyle/>
-          <a:p>
-            <a:pPr marL="0" indent="0">
-              <a:buNone/>
-            </a:pPr>
-            <a:r>
-              <a:rPr lang="en-US" dirty="0"/>
-              <a:t>Conclusion:</a:t>
-            </a:r>
-          </a:p>
-          <a:p>
-            <a:pPr>
-              <a:buFont typeface="Arial" panose="020B0604020202020204" pitchFamily="34" charset="0"/>
-              <a:buChar char="•"/>
-            </a:pPr>
-            <a:r>
-              <a:rPr lang="en-US" dirty="0"/>
-              <a:t>Encouraging preliminary results, but more work needed to improve accuracy and address overfitting</a:t>
-            </a:r>
-          </a:p>
-          <a:p>
-            <a:pPr>
-              <a:buFont typeface="Arial" panose="020B0604020202020204" pitchFamily="34" charset="0"/>
-              <a:buChar char="•"/>
-            </a:pPr>
-            <a:r>
-              <a:rPr lang="en-US" dirty="0"/>
-              <a:t>Further investigation and experimentation required to fully replicate paper's results.</a:t>
-            </a:r>
-          </a:p>
-          <a:p>
-            <a:pPr marL="0" indent="0">
-              <a:buNone/>
-            </a:pPr>
-            <a:r>
-              <a:rPr lang="en-US" dirty="0"/>
-              <a:t>Future Work:</a:t>
-            </a:r>
-          </a:p>
-          <a:p>
-            <a:pPr>
-              <a:buFont typeface="Arial" panose="020B0604020202020204" pitchFamily="34" charset="0"/>
-              <a:buChar char="•"/>
-            </a:pPr>
-            <a:r>
-              <a:rPr lang="en-US" dirty="0"/>
-              <a:t>Attempted to implement our own early stopping mechanism to reduce overfitting and improve test accuracy</a:t>
-            </a:r>
-          </a:p>
-        </p:txBody>
-      </p:sp>
-      <p:sp>
-        <p:nvSpPr>
-          <p:cNvPr id="6" name="Slide Number Placeholder 5">
-            <a:extLst>
-              <a:ext uri="{FF2B5EF4-FFF2-40B4-BE49-F238E27FC236}">
-                <a16:creationId xmlns:a16="http://schemas.microsoft.com/office/drawing/2014/main" id="{A3E3E713-A070-42E3-60AF-E2F15FFACBEC}"/>
-              </a:ext>
-            </a:extLst>
-          </p:cNvPr>
-          <p:cNvSpPr>
-            <a:spLocks noGrp="1"/>
-          </p:cNvSpPr>
-          <p:nvPr>
-            <p:ph type="sldNum" sz="quarter" idx="12"/>
-          </p:nvPr>
-        </p:nvSpPr>
-        <p:spPr>
-          <a:xfrm>
-            <a:off x="11311128" y="6272784"/>
-            <a:ext cx="640080" cy="365125"/>
-          </a:xfrm>
-        </p:spPr>
-        <p:txBody>
-          <a:bodyPr>
-            <a:normAutofit/>
-          </a:bodyPr>
-          <a:lstStyle/>
-          <a:p>
-            <a:pPr>
-              <a:spcAft>
-                <a:spcPts val="600"/>
-              </a:spcAft>
-            </a:pPr>
-            <a:fld id="{D57F1E4F-1CFF-5643-939E-217C01CDF565}" type="slidenum">
-              <a:rPr lang="en-US" smtClean="0"/>
-              <a:pPr>
-                <a:spcAft>
-                  <a:spcPts val="600"/>
-                </a:spcAft>
-              </a:pPr>
-              <a:t>13</a:t>
-            </a:fld>
-            <a:endParaRPr lang="en-US"/>
-          </a:p>
-        </p:txBody>
-      </p:sp>
-      <p:pic>
-        <p:nvPicPr>
-          <p:cNvPr id="3" name="Picture 2">
-            <a:extLst>
-              <a:ext uri="{FF2B5EF4-FFF2-40B4-BE49-F238E27FC236}">
-                <a16:creationId xmlns:a16="http://schemas.microsoft.com/office/drawing/2014/main" id="{BD85E323-E740-307F-E3DA-5159B4755561}"/>
-              </a:ext>
-            </a:extLst>
-          </p:cNvPr>
-          <p:cNvPicPr>
-            <a:picLocks noChangeAspect="1"/>
-          </p:cNvPicPr>
-          <p:nvPr/>
-        </p:nvPicPr>
-        <p:blipFill rotWithShape="1">
-          <a:blip r:embed="rId3"/>
-          <a:srcRect t="-102439" b="-102439"/>
-          <a:stretch/>
-        </p:blipFill>
-        <p:spPr>
-          <a:xfrm>
-            <a:off x="7872307" y="2193036"/>
-            <a:ext cx="3261974" cy="3639872"/>
-          </a:xfrm>
-          <a:prstGeom prst="rect">
-            <a:avLst/>
-          </a:prstGeom>
-        </p:spPr>
-      </p:pic>
-    </p:spTree>
-    <p:extLst>
-      <p:ext uri="{BB962C8B-B14F-4D97-AF65-F5344CB8AC3E}">
-        <p14:creationId xmlns:p14="http://schemas.microsoft.com/office/powerpoint/2010/main" val="535909860"/>
-      </p:ext>
-    </p:extLst>
-  </p:cSld>
-  <p:clrMapOvr>
-    <a:masterClrMapping/>
-  </p:clrMapOvr>
-</p:sld>
-</file>
-
 <file path=ppt/slides/slide2.xml><?xml version="1.0" encoding="utf-8"?>
 <p:sld xmlns:a="http://schemas.openxmlformats.org/drawingml/2006/main" xmlns:r="http://schemas.openxmlformats.org/officeDocument/2006/relationships" xmlns:p="http://schemas.openxmlformats.org/presentationml/2006/main">
   <p:cSld>
@@ -7263,15 +5878,11 @@
           <a:p>
             <a:r>
               <a:rPr lang="en-US" dirty="0"/>
-              <a:t>Graph Attention Networks (GAT)</a:t>
-            </a:r>
-            <a:br>
-              <a:rPr lang="en-US" dirty="0"/>
-            </a:br>
-            <a:r>
-              <a:rPr lang="en-US" dirty="0"/>
-              <a:t>- Introduction</a:t>
-            </a:r>
+              <a:t>Introduction</a:t>
+            </a:r>
+            <a:endParaRPr lang="en-US" dirty="0">
+              <a:latin typeface="Rockwell Condensed"/>
+            </a:endParaRPr>
           </a:p>
         </p:txBody>
       </p:sp>
@@ -7298,7 +5909,7 @@
           </a:xfrm>
         </p:spPr>
         <p:txBody>
-          <a:bodyPr vert="horz" lIns="91440" tIns="45720" rIns="91440" bIns="45720" rtlCol="0">
+          <a:bodyPr vert="horz" lIns="91440" tIns="45720" rIns="91440" bIns="45720" rtlCol="0" anchor="t">
             <a:normAutofit/>
           </a:bodyPr>
           <a:lstStyle/>
@@ -7308,7 +5919,7 @@
             </a:pPr>
             <a:r>
               <a:rPr lang="en-US" dirty="0"/>
-              <a:t>Graph Attention Networks (GAT) is a type of neural network that operates on graph-structured data.</a:t>
+              <a:t>Graph Attention Networks (GAT) are a type of neural network that operates on graph-structured data.</a:t>
             </a:r>
           </a:p>
           <a:p>
@@ -7323,48 +5934,58 @@
           </a:p>
           <a:p>
             <a:pPr>
+              <a:buClr>
+                <a:srgbClr val="9E3611"/>
+              </a:buClr>
               <a:buFont typeface="Arial" panose="020B0604020202020204" pitchFamily="34" charset="0"/>
               <a:buChar char="•"/>
             </a:pPr>
             <a:r>
               <a:rPr lang="en-US" dirty="0"/>
-              <a:t>GAT is based on the attention mechanism, which allows the network to selectively attend to different nodes when computing node representations.</a:t>
-            </a:r>
-          </a:p>
-          <a:p>
+              <a:t>Works on arbitrarily-structured graphs</a:t>
+            </a:r>
+          </a:p>
+          <a:p>
+            <a:pPr>
+              <a:buClr>
+                <a:srgbClr val="9E3611"/>
+              </a:buClr>
+              <a:buFont typeface="Arial" panose="020B0604020202020204" pitchFamily="34" charset="0"/>
+              <a:buChar char="•"/>
+            </a:pPr>
+            <a:r>
+              <a:rPr lang="en-US" dirty="0"/>
+              <a:t>Processes nodes in parallel</a:t>
+            </a:r>
+          </a:p>
+          <a:p>
+            <a:pPr>
+              <a:buClr>
+                <a:srgbClr val="9E3611"/>
+              </a:buClr>
+              <a:buFont typeface="Arial" panose="020B0604020202020204" pitchFamily="34" charset="0"/>
+              <a:buChar char="•"/>
+            </a:pPr>
+            <a:r>
+              <a:rPr lang="en-US" dirty="0"/>
+              <a:t>Reuses learned weights across nodes, like CNNs</a:t>
+            </a:r>
+          </a:p>
+          <a:p>
+            <a:pPr lvl="1">
+              <a:buClr>
+                <a:srgbClr val="9E3611"/>
+              </a:buClr>
+              <a:buFont typeface="Arial" panose="020B0604020202020204" pitchFamily="34" charset="0"/>
+              <a:buChar char="•"/>
+            </a:pPr>
             <a:endParaRPr lang="en-US" dirty="0"/>
           </a:p>
-        </p:txBody>
-      </p:sp>
-      <p:pic>
-        <p:nvPicPr>
-          <p:cNvPr id="6" name="Picture 5">
-            <a:extLst>
-              <a:ext uri="{FF2B5EF4-FFF2-40B4-BE49-F238E27FC236}">
-                <a16:creationId xmlns:a16="http://schemas.microsoft.com/office/drawing/2014/main" id="{60F2EF7D-24B0-6319-BA90-14060DEBA326}"/>
-              </a:ext>
-            </a:extLst>
-          </p:cNvPr>
-          <p:cNvPicPr>
-            <a:picLocks noChangeAspect="1"/>
-          </p:cNvPicPr>
-          <p:nvPr/>
-        </p:nvPicPr>
-        <p:blipFill rotWithShape="1">
-          <a:blip r:embed="rId2"/>
-          <a:srcRect t="-30321" b="-30321"/>
-          <a:stretch/>
-        </p:blipFill>
-        <p:spPr>
-          <a:xfrm>
-            <a:off x="7872307" y="2193036"/>
-            <a:ext cx="3261974" cy="3639872"/>
-          </a:xfrm>
-          <a:prstGeom prst="rect">
-            <a:avLst/>
-          </a:prstGeom>
-        </p:spPr>
-      </p:pic>
+          <a:p>
+            <a:endParaRPr lang="en-US" dirty="0"/>
+          </a:p>
+        </p:txBody>
+      </p:sp>
       <p:sp>
         <p:nvSpPr>
           <p:cNvPr id="4" name="Slide Number Placeholder 3">
@@ -7427,14 +6048,6 @@
 <file path=ppt/slides/slide3.xml><?xml version="1.0" encoding="utf-8"?>
 <p:sld xmlns:a="http://schemas.openxmlformats.org/drawingml/2006/main" xmlns:r="http://schemas.openxmlformats.org/officeDocument/2006/relationships" xmlns:p="http://schemas.openxmlformats.org/presentationml/2006/main">
   <p:cSld>
-    <p:bg>
-      <p:bgPr>
-        <a:solidFill>
-          <a:schemeClr val="bg1"/>
-        </a:solidFill>
-        <a:effectLst/>
-      </p:bgPr>
-    </p:bg>
     <p:spTree>
       <p:nvGrpSpPr>
         <p:cNvPr id="1" name=""/>
@@ -7454,7 +6067,7 @@
           <p:cNvPr id="2" name="Title 1">
             <a:extLst>
               <a:ext uri="{FF2B5EF4-FFF2-40B4-BE49-F238E27FC236}">
-                <a16:creationId xmlns:a16="http://schemas.microsoft.com/office/drawing/2014/main" id="{2166409C-8181-C8EB-4B9E-20A533ECA892}"/>
+                <a16:creationId xmlns:a16="http://schemas.microsoft.com/office/drawing/2014/main" id="{61C3228C-D40D-2E77-F06F-35EC71447EF8}"/>
               </a:ext>
             </a:extLst>
           </p:cNvPr>
@@ -7465,38 +6078,113 @@
             <p:ph type="title"/>
           </p:nvPr>
         </p:nvSpPr>
-        <p:spPr>
-          <a:xfrm>
-            <a:off x="1069848" y="484632"/>
-            <a:ext cx="10058400" cy="1609344"/>
-          </a:xfrm>
-        </p:spPr>
-        <p:txBody>
-          <a:bodyPr>
+        <p:spPr/>
+        <p:txBody>
+          <a:bodyPr/>
+          <a:lstStyle/>
+          <a:p>
+            <a:r>
+              <a:rPr lang="en-US" dirty="0"/>
+              <a:t>objectives</a:t>
+            </a:r>
+          </a:p>
+        </p:txBody>
+      </p:sp>
+      <p:sp>
+        <p:nvSpPr>
+          <p:cNvPr id="3" name="Content Placeholder 2">
+            <a:extLst>
+              <a:ext uri="{FF2B5EF4-FFF2-40B4-BE49-F238E27FC236}">
+                <a16:creationId xmlns:a16="http://schemas.microsoft.com/office/drawing/2014/main" id="{8C7AB065-CFC0-4EE9-5A63-CAE3C8AE92F1}"/>
+              </a:ext>
+            </a:extLst>
+          </p:cNvPr>
+          <p:cNvSpPr>
+            <a:spLocks noGrp="1"/>
+          </p:cNvSpPr>
+          <p:nvPr>
+            <p:ph idx="1"/>
+          </p:nvPr>
+        </p:nvSpPr>
+        <p:spPr/>
+        <p:txBody>
+          <a:bodyPr vert="horz" lIns="91440" tIns="45720" rIns="91440" bIns="45720" rtlCol="0" anchor="t">
             <a:normAutofit/>
           </a:bodyPr>
           <a:lstStyle/>
           <a:p>
+            <a:pPr>
+              <a:buClr>
+                <a:srgbClr val="9E3611"/>
+              </a:buClr>
+              <a:buFont typeface="Arial" pitchFamily="2" charset="2"/>
+              <a:buChar char="•"/>
+            </a:pPr>
             <a:r>
               <a:rPr lang="en-US" dirty="0"/>
-              <a:t>Graph Attention Networks (GAT)</a:t>
-            </a:r>
-            <a:br>
+              <a:t>Reproduce paper as closely as possible</a:t>
+            </a:r>
+          </a:p>
+          <a:p>
+            <a:pPr lvl="1">
+              <a:buClr>
+                <a:srgbClr val="9E3611"/>
+              </a:buClr>
+              <a:buFont typeface="Arial" pitchFamily="2" charset="2"/>
+              <a:buChar char="•"/>
+            </a:pPr>
+            <a:r>
               <a:rPr lang="en-US" dirty="0"/>
-            </a:br>
+              <a:t>Architectures</a:t>
+            </a:r>
+          </a:p>
+          <a:p>
+            <a:pPr lvl="1">
+              <a:buClr>
+                <a:srgbClr val="9E3611"/>
+              </a:buClr>
+              <a:buFont typeface="Arial" pitchFamily="2" charset="2"/>
+              <a:buChar char="•"/>
+            </a:pPr>
             <a:r>
               <a:rPr lang="en-US" dirty="0"/>
-              <a:t>- Background</a:t>
-            </a:r>
-          </a:p>
-        </p:txBody>
-      </p:sp>
-      <p:sp>
-        <p:nvSpPr>
-          <p:cNvPr id="42" name="Content Placeholder 2">
+              <a:t>Datasets</a:t>
+            </a:r>
+          </a:p>
+          <a:p>
+            <a:pPr lvl="1">
+              <a:buClr>
+                <a:srgbClr val="9E3611"/>
+              </a:buClr>
+              <a:buFont typeface="Arial" pitchFamily="2" charset="2"/>
+              <a:buChar char="•"/>
+            </a:pPr>
+            <a:r>
+              <a:rPr lang="en-US" dirty="0"/>
+              <a:t>Training/testing methodology</a:t>
+            </a:r>
+          </a:p>
+          <a:p>
+            <a:pPr>
+              <a:buClr>
+                <a:srgbClr val="9E3611"/>
+              </a:buClr>
+              <a:buFont typeface="Arial" pitchFamily="2" charset="2"/>
+              <a:buChar char="•"/>
+            </a:pPr>
+            <a:r>
+              <a:rPr lang="en-US" dirty="0"/>
+              <a:t>Try out model variants</a:t>
+            </a:r>
+          </a:p>
+        </p:txBody>
+      </p:sp>
+      <p:sp>
+        <p:nvSpPr>
+          <p:cNvPr id="4" name="Slide Number Placeholder 3">
             <a:extLst>
               <a:ext uri="{FF2B5EF4-FFF2-40B4-BE49-F238E27FC236}">
-                <a16:creationId xmlns:a16="http://schemas.microsoft.com/office/drawing/2014/main" id="{1FD71070-A4EC-42D4-020D-ACA1B2467EA0}"/>
+                <a16:creationId xmlns:a16="http://schemas.microsoft.com/office/drawing/2014/main" id="{88BF4695-02DC-9796-38C7-BA01056FB082}"/>
               </a:ext>
             </a:extLst>
           </p:cNvPr>
@@ -7504,145 +6192,27 @@
             <a:spLocks noGrp="1"/>
           </p:cNvSpPr>
           <p:nvPr>
-            <p:ph idx="1"/>
-          </p:nvPr>
-        </p:nvSpPr>
-        <p:spPr>
-          <a:xfrm>
-            <a:off x="1069847" y="2121408"/>
-            <a:ext cx="6482419" cy="4050792"/>
-          </a:xfrm>
-        </p:spPr>
-        <p:txBody>
-          <a:bodyPr>
-            <a:normAutofit lnSpcReduction="10000"/>
-          </a:bodyPr>
+            <p:ph type="sldNum" sz="quarter" idx="12"/>
+          </p:nvPr>
+        </p:nvSpPr>
+        <p:spPr/>
+        <p:txBody>
+          <a:bodyPr/>
           <a:lstStyle/>
           <a:p>
-            <a:pPr>
-              <a:buFont typeface="Arial" panose="020B0604020202020204" pitchFamily="34" charset="0"/>
-              <a:buChar char="•"/>
-            </a:pPr>
-            <a:r>
-              <a:rPr lang="en-US" dirty="0"/>
-              <a:t>Graphs are ubiquitous data structures used to model relationships between entities in various domains such as social networks, bioinformatics, and recommendation systems.</a:t>
-            </a:r>
-          </a:p>
-          <a:p>
-            <a:pPr>
-              <a:buFont typeface="Arial" panose="020B0604020202020204" pitchFamily="34" charset="0"/>
-              <a:buChar char="•"/>
-            </a:pPr>
-            <a:r>
-              <a:rPr lang="en-US" dirty="0"/>
-              <a:t>Traditional neural networks cannot be applied directly to graphs due to the irregular and varying size of graphs.</a:t>
-            </a:r>
-          </a:p>
-          <a:p>
-            <a:pPr>
-              <a:buFont typeface="Arial" panose="020B0604020202020204" pitchFamily="34" charset="0"/>
-              <a:buChar char="•"/>
-            </a:pPr>
-            <a:r>
-              <a:rPr lang="en-US" dirty="0"/>
-              <a:t>Graph Convolutional Networks (GCN) was introduced as a way to extend convolutional neural networks (CNN) to graphs.</a:t>
-            </a:r>
-          </a:p>
-          <a:p>
-            <a:pPr>
-              <a:buFont typeface="Arial" panose="020B0604020202020204" pitchFamily="34" charset="0"/>
-              <a:buChar char="•"/>
-            </a:pPr>
-            <a:r>
-              <a:rPr lang="en-US" dirty="0"/>
-              <a:t>However, GCN has limitations such as over-smoothing and the inability to capture multi-hop relations</a:t>
-            </a:r>
-            <a:r>
-              <a:rPr lang="en-US" sz="2000" dirty="0"/>
-              <a:t>.</a:t>
-            </a:r>
-          </a:p>
-        </p:txBody>
-      </p:sp>
-      <p:sp>
-        <p:nvSpPr>
-          <p:cNvPr id="6" name="Slide Number Placeholder 5">
-            <a:extLst>
-              <a:ext uri="{FF2B5EF4-FFF2-40B4-BE49-F238E27FC236}">
-                <a16:creationId xmlns:a16="http://schemas.microsoft.com/office/drawing/2014/main" id="{A3E3E713-A070-42E3-60AF-E2F15FFACBEC}"/>
-              </a:ext>
-            </a:extLst>
-          </p:cNvPr>
-          <p:cNvSpPr>
-            <a:spLocks noGrp="1"/>
-          </p:cNvSpPr>
-          <p:nvPr>
-            <p:ph type="sldNum" sz="quarter" idx="12"/>
-          </p:nvPr>
-        </p:nvSpPr>
-        <p:spPr>
-          <a:xfrm>
-            <a:off x="11311128" y="6272784"/>
-            <a:ext cx="640080" cy="365125"/>
-          </a:xfrm>
-        </p:spPr>
-        <p:txBody>
-          <a:bodyPr>
-            <a:normAutofit/>
-          </a:bodyPr>
-          <a:lstStyle/>
-          <a:p>
-            <a:pPr>
-              <a:spcAft>
-                <a:spcPts val="600"/>
-              </a:spcAft>
-            </a:pPr>
             <a:fld id="{D57F1E4F-1CFF-5643-939E-217C01CDF565}" type="slidenum">
               <a:rPr lang="en-US" smtClean="0"/>
-              <a:pPr>
-                <a:spcAft>
-                  <a:spcPts val="600"/>
-                </a:spcAft>
-              </a:pPr>
+              <a:pPr/>
               <a:t>3</a:t>
             </a:fld>
-            <a:endParaRPr lang="en-US"/>
-          </a:p>
-        </p:txBody>
-      </p:sp>
-      <p:pic>
-        <p:nvPicPr>
-          <p:cNvPr id="3" name="Picture 2" descr="Illuminated server room panel">
-            <a:extLst>
-              <a:ext uri="{FF2B5EF4-FFF2-40B4-BE49-F238E27FC236}">
-                <a16:creationId xmlns:a16="http://schemas.microsoft.com/office/drawing/2014/main" id="{B5AEF05D-3A31-07AD-7193-E0F4AF0E6605}"/>
-              </a:ext>
-            </a:extLst>
-          </p:cNvPr>
-          <p:cNvPicPr>
-            <a:picLocks noChangeAspect="1"/>
-          </p:cNvPicPr>
-          <p:nvPr/>
-        </p:nvPicPr>
-        <p:blipFill>
-          <a:blip r:embed="rId2"/>
-          <a:srcRect l="20157" r="20157"/>
-          <a:stretch/>
-        </p:blipFill>
-        <p:spPr>
-          <a:xfrm>
-            <a:off x="7872307" y="2193036"/>
-            <a:ext cx="3261974" cy="3639872"/>
-          </a:xfrm>
-          <a:prstGeom prst="rect">
-            <a:avLst/>
-          </a:prstGeom>
-        </p:spPr>
-      </p:pic>
+            <a:endParaRPr lang="en-US" dirty="0"/>
+          </a:p>
+        </p:txBody>
+      </p:sp>
     </p:spTree>
     <p:extLst>
       <p:ext uri="{BB962C8B-B14F-4D97-AF65-F5344CB8AC3E}">
-        <p14:creationId xmlns:p14="http://schemas.microsoft.com/office/powerpoint/2010/main" val="109599866"/>
+        <p14:creationId xmlns:p14="http://schemas.microsoft.com/office/powerpoint/2010/main" val="2512249046"/>
       </p:ext>
     </p:extLst>
   </p:cSld>
@@ -7674,7 +6244,7 @@
           <p:cNvPr id="2" name="Title 1">
             <a:extLst>
               <a:ext uri="{FF2B5EF4-FFF2-40B4-BE49-F238E27FC236}">
-                <a16:creationId xmlns:a16="http://schemas.microsoft.com/office/drawing/2014/main" id="{2166409C-8181-C8EB-4B9E-20A533ECA892}"/>
+                <a16:creationId xmlns:a16="http://schemas.microsoft.com/office/drawing/2014/main" id="{90CFC480-953C-1137-99DB-7E3CC5BB6228}"/>
               </a:ext>
             </a:extLst>
           </p:cNvPr>
@@ -7685,38 +6255,24 @@
             <p:ph type="title"/>
           </p:nvPr>
         </p:nvSpPr>
-        <p:spPr>
-          <a:xfrm>
-            <a:off x="1069848" y="484632"/>
-            <a:ext cx="10058400" cy="1609344"/>
-          </a:xfrm>
-        </p:spPr>
-        <p:txBody>
-          <a:bodyPr>
-            <a:normAutofit/>
-          </a:bodyPr>
+        <p:spPr/>
+        <p:txBody>
+          <a:bodyPr/>
           <a:lstStyle/>
           <a:p>
             <a:r>
               <a:rPr lang="en-US" dirty="0"/>
-              <a:t>Graph Attention Networks (GAT)</a:t>
-            </a:r>
-            <a:br>
-              <a:rPr lang="en-US" dirty="0"/>
-            </a:br>
-            <a:r>
-              <a:rPr lang="en-US" dirty="0"/>
-              <a:t>- architecture</a:t>
-            </a:r>
-          </a:p>
-        </p:txBody>
-      </p:sp>
-      <p:sp>
-        <p:nvSpPr>
-          <p:cNvPr id="42" name="Content Placeholder 2">
+              <a:t>Replication - architectures</a:t>
+            </a:r>
+          </a:p>
+        </p:txBody>
+      </p:sp>
+      <p:sp>
+        <p:nvSpPr>
+          <p:cNvPr id="3" name="Content Placeholder 2">
             <a:extLst>
               <a:ext uri="{FF2B5EF4-FFF2-40B4-BE49-F238E27FC236}">
-                <a16:creationId xmlns:a16="http://schemas.microsoft.com/office/drawing/2014/main" id="{1FD71070-A4EC-42D4-020D-ACA1B2467EA0}"/>
+                <a16:creationId xmlns:a16="http://schemas.microsoft.com/office/drawing/2014/main" id="{3EA5DC91-8567-49D8-3773-FC0666FD342C}"/>
               </a:ext>
             </a:extLst>
           </p:cNvPr>
@@ -7727,64 +6283,214 @@
             <p:ph idx="1"/>
           </p:nvPr>
         </p:nvSpPr>
-        <p:spPr>
-          <a:xfrm>
-            <a:off x="1069847" y="2121408"/>
-            <a:ext cx="6482419" cy="4050792"/>
-          </a:xfrm>
-        </p:spPr>
-        <p:txBody>
-          <a:bodyPr>
-            <a:normAutofit fontScale="92500"/>
+        <p:spPr/>
+        <p:txBody>
+          <a:bodyPr vert="horz" lIns="91440" tIns="45720" rIns="91440" bIns="45720" rtlCol="0" anchor="t">
+            <a:normAutofit lnSpcReduction="10000"/>
           </a:bodyPr>
           <a:lstStyle/>
           <a:p>
-            <a:pPr marL="0" indent="0">
-              <a:buNone/>
+            <a:pPr>
+              <a:buFont typeface="Arial" pitchFamily="2" charset="2"/>
+              <a:buChar char="•"/>
             </a:pPr>
             <a:r>
-              <a:rPr lang="en-US" sz="2200" dirty="0"/>
-              <a:t>GAT extends the GCN architecture by introducing the attention mechanism.</a:t>
-            </a:r>
-          </a:p>
-          <a:p>
-            <a:r>
-              <a:rPr lang="en-US" sz="2200" dirty="0"/>
-              <a:t>The attention mechanism computes weights for each neighboring node based on the current node's representation, allowing the network to selectively attend to important neighbors.</a:t>
-            </a:r>
-          </a:p>
-          <a:p>
-            <a:r>
-              <a:rPr lang="en-US" sz="2200" dirty="0"/>
-              <a:t>The attention weights are computed as a learned function of the node features and the weight matrix.</a:t>
-            </a:r>
-          </a:p>
-          <a:p>
-            <a:r>
-              <a:rPr lang="en-US" sz="2200" dirty="0"/>
-              <a:t>Multiple attention heads are used to compute multiple representations for each node, which are then concatenated and passed through a non-linearity to compute the final node representation.</a:t>
-            </a:r>
-          </a:p>
-          <a:p>
-            <a:pPr marL="0" indent="0">
-              <a:buNone/>
+              <a:rPr lang="en-US" dirty="0"/>
+              <a:t>For Cora and </a:t>
+            </a:r>
+            <a:r>
+              <a:rPr lang="en-US" dirty="0" err="1"/>
+              <a:t>Citeseer</a:t>
+            </a:r>
+            <a:r>
+              <a:rPr lang="en-US" dirty="0"/>
+              <a:t> datasets:</a:t>
+            </a:r>
+          </a:p>
+          <a:p>
+            <a:pPr lvl="1">
+              <a:buClr>
+                <a:srgbClr val="9E3611"/>
+              </a:buClr>
+              <a:buFont typeface="Arial" pitchFamily="2" charset="2"/>
+              <a:buChar char="•"/>
             </a:pPr>
-            <a:endParaRPr lang="en-US" sz="1500" dirty="0"/>
-          </a:p>
-          <a:p>
-            <a:pPr marL="0" indent="0">
-              <a:buNone/>
+            <a:r>
+              <a:rPr lang="en-US" dirty="0"/>
+              <a:t>Two-layer GAT models</a:t>
+            </a:r>
+          </a:p>
+          <a:p>
+            <a:pPr lvl="2">
+              <a:buClr>
+                <a:srgbClr val="9E3611"/>
+              </a:buClr>
+              <a:buFont typeface="Arial" pitchFamily="2" charset="2"/>
+              <a:buChar char="•"/>
             </a:pPr>
-            <a:endParaRPr lang="en-US" sz="1500" dirty="0"/>
-          </a:p>
-        </p:txBody>
-      </p:sp>
-      <p:sp>
-        <p:nvSpPr>
-          <p:cNvPr id="6" name="Slide Number Placeholder 5">
+            <a:r>
+              <a:rPr lang="en-US" dirty="0"/>
+              <a:t>First layer has 8 attention heads, each head outputs 8-dimensional data, uses an </a:t>
+            </a:r>
+            <a:r>
+              <a:rPr lang="en-US" dirty="0" err="1"/>
+              <a:t>exponentional</a:t>
+            </a:r>
+            <a:r>
+              <a:rPr lang="en-US" dirty="0"/>
+              <a:t> linear unit (ELU) as the activation function</a:t>
+            </a:r>
+          </a:p>
+          <a:p>
+            <a:pPr lvl="2">
+              <a:buClr>
+                <a:srgbClr val="9E3611"/>
+              </a:buClr>
+              <a:buFont typeface="Arial" pitchFamily="2" charset="2"/>
+              <a:buChar char="•"/>
+            </a:pPr>
+            <a:r>
+              <a:rPr lang="en-US" dirty="0"/>
+              <a:t>Second layer has one attention head, outputs C-dimensional data (C = number of classes in dataset), and uses </a:t>
+            </a:r>
+            <a:r>
+              <a:rPr lang="en-US" err="1"/>
+              <a:t>softmax</a:t>
+            </a:r>
+            <a:r>
+              <a:rPr lang="en-US"/>
+              <a:t> as the activation function</a:t>
+            </a:r>
+          </a:p>
+          <a:p>
+            <a:pPr lvl="1">
+              <a:buClr>
+                <a:srgbClr val="9E3611"/>
+              </a:buClr>
+              <a:buFont typeface="Arial" pitchFamily="2" charset="2"/>
+              <a:buChar char="•"/>
+            </a:pPr>
+            <a:r>
+              <a:rPr lang="en-US" dirty="0"/>
+              <a:t>Uses L2 </a:t>
+            </a:r>
+            <a:r>
+              <a:rPr lang="en-US" err="1"/>
+              <a:t>regulariztion</a:t>
+            </a:r>
+            <a:r>
+              <a:rPr lang="en-US"/>
+              <a:t> with lambda = 0.0005 and dropout with p = 0.6</a:t>
+            </a:r>
+          </a:p>
+          <a:p>
+            <a:pPr>
+              <a:spcAft>
+                <a:spcPts val="200"/>
+              </a:spcAft>
+              <a:buClr>
+                <a:srgbClr val="9E3611"/>
+              </a:buClr>
+              <a:buFont typeface="Arial" pitchFamily="2" charset="2"/>
+              <a:buChar char="•"/>
+            </a:pPr>
+            <a:r>
+              <a:rPr lang="en-US" dirty="0"/>
+              <a:t>For </a:t>
+            </a:r>
+            <a:r>
+              <a:rPr lang="en-US" err="1"/>
+              <a:t>Pubmed</a:t>
+            </a:r>
+            <a:r>
+              <a:rPr lang="en-US" dirty="0"/>
+              <a:t> dataset, the model is almost the same as for Cora and </a:t>
+            </a:r>
+            <a:r>
+              <a:rPr lang="en-US" err="1"/>
+              <a:t>Citeseer</a:t>
+            </a:r>
+            <a:r>
+              <a:rPr lang="en-US" dirty="0"/>
+              <a:t>, but </a:t>
+            </a:r>
+            <a:r>
+              <a:rPr lang="en-US"/>
+              <a:t>second layer has 8 attention heads and L2 regularization uses lambda = 0.001.</a:t>
+            </a:r>
+            <a:endParaRPr lang="en-US" dirty="0"/>
+          </a:p>
+          <a:p>
+            <a:pPr>
+              <a:spcAft>
+                <a:spcPts val="200"/>
+              </a:spcAft>
+              <a:buClr>
+                <a:srgbClr val="9E3611"/>
+              </a:buClr>
+              <a:buFont typeface="Arial" pitchFamily="2" charset="2"/>
+              <a:buChar char="•"/>
+            </a:pPr>
+            <a:r>
+              <a:rPr lang="en-US" dirty="0"/>
+              <a:t>For PPI dataset:</a:t>
+            </a:r>
+          </a:p>
+          <a:p>
+            <a:pPr lvl="1">
+              <a:buClr>
+                <a:srgbClr val="9E3611"/>
+              </a:buClr>
+              <a:buFont typeface="Arial" pitchFamily="2" charset="2"/>
+              <a:buChar char="•"/>
+            </a:pPr>
+            <a:r>
+              <a:rPr lang="en-US" dirty="0"/>
+              <a:t>Three-layer GAT model</a:t>
+            </a:r>
+          </a:p>
+          <a:p>
+            <a:pPr lvl="2">
+              <a:buClr>
+                <a:srgbClr val="9E3611"/>
+              </a:buClr>
+              <a:buFont typeface="Arial" pitchFamily="2" charset="2"/>
+              <a:buChar char="•"/>
+            </a:pPr>
+            <a:r>
+              <a:rPr lang="en-US" dirty="0"/>
+              <a:t>First two layers have 4 attention heads, output 256-dimensional data, and use ELU activation</a:t>
+            </a:r>
+          </a:p>
+          <a:p>
+            <a:pPr lvl="2">
+              <a:buClr>
+                <a:srgbClr val="9E3611"/>
+              </a:buClr>
+              <a:buFont typeface="Arial" pitchFamily="2" charset="2"/>
+              <a:buChar char="•"/>
+            </a:pPr>
+            <a:r>
+              <a:rPr lang="en-US" dirty="0"/>
+              <a:t>Third layer has 6 attention heads, outputs 121-dimensional data, and uses </a:t>
+            </a:r>
+            <a:r>
+              <a:rPr lang="en-US" dirty="0" err="1"/>
+              <a:t>softmax</a:t>
+            </a:r>
+            <a:r>
+              <a:rPr lang="en-US" dirty="0"/>
+              <a:t> activation</a:t>
+            </a:r>
+          </a:p>
+        </p:txBody>
+      </p:sp>
+      <p:sp>
+        <p:nvSpPr>
+          <p:cNvPr id="4" name="Slide Number Placeholder 3">
             <a:extLst>
               <a:ext uri="{FF2B5EF4-FFF2-40B4-BE49-F238E27FC236}">
-                <a16:creationId xmlns:a16="http://schemas.microsoft.com/office/drawing/2014/main" id="{A3E3E713-A070-42E3-60AF-E2F15FFACBEC}"/>
+                <a16:creationId xmlns:a16="http://schemas.microsoft.com/office/drawing/2014/main" id="{2256DADE-ADDF-5FAE-AA05-8300980A2892}"/>
               </a:ext>
             </a:extLst>
           </p:cNvPr>
@@ -7795,69 +6501,24 @@
             <p:ph type="sldNum" sz="quarter" idx="12"/>
           </p:nvPr>
         </p:nvSpPr>
-        <p:spPr>
-          <a:xfrm>
-            <a:off x="11311128" y="6272784"/>
-            <a:ext cx="640080" cy="365125"/>
-          </a:xfrm>
-        </p:spPr>
-        <p:txBody>
-          <a:bodyPr>
-            <a:normAutofit/>
-          </a:bodyPr>
+        <p:spPr/>
+        <p:txBody>
+          <a:bodyPr/>
           <a:lstStyle/>
           <a:p>
-            <a:pPr>
-              <a:spcAft>
-                <a:spcPts val="600"/>
-              </a:spcAft>
-            </a:pPr>
             <a:fld id="{D57F1E4F-1CFF-5643-939E-217C01CDF565}" type="slidenum">
               <a:rPr lang="en-US" smtClean="0"/>
-              <a:pPr>
-                <a:spcAft>
-                  <a:spcPts val="600"/>
-                </a:spcAft>
-              </a:pPr>
+              <a:pPr/>
               <a:t>4</a:t>
             </a:fld>
-            <a:endParaRPr lang="en-US"/>
-          </a:p>
-        </p:txBody>
-      </p:sp>
-      <p:pic>
-        <p:nvPicPr>
-          <p:cNvPr id="3" name="Picture 2">
-            <a:extLst>
-              <a:ext uri="{FF2B5EF4-FFF2-40B4-BE49-F238E27FC236}">
-                <a16:creationId xmlns:a16="http://schemas.microsoft.com/office/drawing/2014/main" id="{BD85E323-E740-307F-E3DA-5159B4755561}"/>
-              </a:ext>
-            </a:extLst>
-          </p:cNvPr>
-          <p:cNvPicPr>
-            <a:picLocks noChangeAspect="1"/>
-          </p:cNvPicPr>
-          <p:nvPr/>
-        </p:nvPicPr>
-        <p:blipFill rotWithShape="1">
-          <a:blip r:embed="rId2"/>
-          <a:srcRect t="-35409" b="-35409"/>
-          <a:stretch/>
-        </p:blipFill>
-        <p:spPr>
-          <a:xfrm>
-            <a:off x="7872307" y="2193036"/>
-            <a:ext cx="3261974" cy="3639872"/>
-          </a:xfrm>
-          <a:prstGeom prst="rect">
-            <a:avLst/>
-          </a:prstGeom>
-        </p:spPr>
-      </p:pic>
+            <a:endParaRPr lang="en-US" dirty="0"/>
+          </a:p>
+        </p:txBody>
+      </p:sp>
     </p:spTree>
     <p:extLst>
       <p:ext uri="{BB962C8B-B14F-4D97-AF65-F5344CB8AC3E}">
-        <p14:creationId xmlns:p14="http://schemas.microsoft.com/office/powerpoint/2010/main" val="3174278635"/>
+        <p14:creationId xmlns:p14="http://schemas.microsoft.com/office/powerpoint/2010/main" val="2250056269"/>
       </p:ext>
     </p:extLst>
   </p:cSld>
@@ -7870,6 +6531,14 @@
 <file path=ppt/slides/slide5.xml><?xml version="1.0" encoding="utf-8"?>
 <p:sld xmlns:a="http://schemas.openxmlformats.org/drawingml/2006/main" xmlns:r="http://schemas.openxmlformats.org/officeDocument/2006/relationships" xmlns:p="http://schemas.openxmlformats.org/presentationml/2006/main">
   <p:cSld>
+    <p:bg>
+      <p:bgPr>
+        <a:solidFill>
+          <a:schemeClr val="bg1"/>
+        </a:solidFill>
+        <a:effectLst/>
+      </p:bgPr>
+    </p:bg>
     <p:spTree>
       <p:nvGrpSpPr>
         <p:cNvPr id="1" name=""/>
@@ -7889,7 +6558,7 @@
           <p:cNvPr id="2" name="Title 1">
             <a:extLst>
               <a:ext uri="{FF2B5EF4-FFF2-40B4-BE49-F238E27FC236}">
-                <a16:creationId xmlns:a16="http://schemas.microsoft.com/office/drawing/2014/main" id="{2166409C-8181-C8EB-4B9E-20A533ECA892}"/>
+                <a16:creationId xmlns:a16="http://schemas.microsoft.com/office/drawing/2014/main" id="{1D1AB017-93C0-6F4C-0F56-E78C089D5633}"/>
               </a:ext>
             </a:extLst>
           </p:cNvPr>
@@ -7914,24 +6583,20 @@
           <a:p>
             <a:r>
               <a:rPr lang="en-US" dirty="0"/>
-              <a:t>Graph Attention Networks (GAT)</a:t>
-            </a:r>
-            <a:br>
-              <a:rPr lang="en-US" dirty="0"/>
-            </a:br>
-            <a:r>
-              <a:rPr lang="en-US" dirty="0"/>
-              <a:t>- ADVANTAGES</a:t>
-            </a:r>
-          </a:p>
-        </p:txBody>
-      </p:sp>
-      <p:sp>
-        <p:nvSpPr>
-          <p:cNvPr id="42" name="Content Placeholder 2">
+              <a:t>Replication - results</a:t>
+            </a:r>
+            <a:endParaRPr lang="en-US" dirty="0">
+              <a:latin typeface="Rockwell Condensed"/>
+            </a:endParaRPr>
+          </a:p>
+        </p:txBody>
+      </p:sp>
+      <p:sp>
+        <p:nvSpPr>
+          <p:cNvPr id="8" name="Content Placeholder 7">
             <a:extLst>
               <a:ext uri="{FF2B5EF4-FFF2-40B4-BE49-F238E27FC236}">
-                <a16:creationId xmlns:a16="http://schemas.microsoft.com/office/drawing/2014/main" id="{1FD71070-A4EC-42D4-020D-ACA1B2467EA0}"/>
+                <a16:creationId xmlns:a16="http://schemas.microsoft.com/office/drawing/2014/main" id="{06A1F6CF-BBD6-9691-9EC8-BA20E390660F}"/>
               </a:ext>
             </a:extLst>
           </p:cNvPr>
@@ -7944,72 +6609,214 @@
         </p:nvSpPr>
         <p:spPr>
           <a:xfrm>
-            <a:off x="1069847" y="2121408"/>
-            <a:ext cx="6482419" cy="4050792"/>
+            <a:off x="1069848" y="2101616"/>
+            <a:ext cx="4773168" cy="4753415"/>
           </a:xfrm>
         </p:spPr>
         <p:txBody>
-          <a:bodyPr>
-            <a:normAutofit/>
+          <a:bodyPr vert="horz" lIns="91440" tIns="45720" rIns="91440" bIns="45720" rtlCol="0" anchor="t">
+            <a:normAutofit fontScale="92500" lnSpcReduction="20000"/>
           </a:bodyPr>
           <a:lstStyle/>
           <a:p>
-            <a:pPr marL="0" indent="0">
-              <a:buNone/>
-            </a:pPr>
-            <a:r>
-              <a:rPr lang="en-US" sz="2000" dirty="0"/>
-              <a:t>GAT has several advantages over GCN:</a:t>
-            </a:r>
-          </a:p>
-          <a:p>
-            <a:r>
-              <a:rPr lang="en-US" sz="2000" dirty="0"/>
-              <a:t>The attention mechanism allows for selective and adaptive aggregation of neighbor nodes.</a:t>
-            </a:r>
-          </a:p>
-          <a:p>
             <a:pPr>
-              <a:buFont typeface="Arial" panose="020B0604020202020204" pitchFamily="34" charset="0"/>
+              <a:buFont typeface="Arial" pitchFamily="2" charset="2"/>
               <a:buChar char="•"/>
             </a:pPr>
             <a:r>
-              <a:rPr lang="en-US" sz="2000" dirty="0"/>
-              <a:t>Multi-head attention allows for capturing different types of dependencies.</a:t>
-            </a:r>
-          </a:p>
-          <a:p>
-            <a:pPr>
-              <a:buFont typeface="Arial" panose="020B0604020202020204" pitchFamily="34" charset="0"/>
+              <a:rPr lang="en-US" dirty="0"/>
+              <a:t>Ran GAT, </a:t>
+            </a:r>
+            <a:r>
+              <a:rPr lang="en-US" err="1"/>
+              <a:t>GATConv</a:t>
+            </a:r>
+            <a:r>
+              <a:rPr lang="en-US" dirty="0"/>
+              <a:t> and GATv2Conv models 50 times on </a:t>
+            </a:r>
+            <a:r>
+              <a:rPr lang="en-US" err="1"/>
+              <a:t>Citeseer</a:t>
+            </a:r>
+            <a:r>
+              <a:rPr lang="en-US" dirty="0"/>
+              <a:t>, Cora and </a:t>
+            </a:r>
+            <a:r>
+              <a:rPr lang="en-US" err="1"/>
+              <a:t>Pubmed</a:t>
+            </a:r>
+            <a:r>
+              <a:rPr lang="en-US" dirty="0"/>
+              <a:t> datasets</a:t>
+            </a:r>
+          </a:p>
+          <a:p>
+            <a:pPr lvl="1">
+              <a:buClr>
+                <a:srgbClr val="9E3611"/>
+              </a:buClr>
+              <a:buFont typeface="Arial" pitchFamily="2" charset="2"/>
               <a:buChar char="•"/>
             </a:pPr>
             <a:r>
-              <a:rPr lang="en-US" sz="2000" dirty="0"/>
-              <a:t>GAT can capture long-range dependencies by attending to distant nodes in the graph.</a:t>
+              <a:rPr lang="en-US" dirty="0"/>
+              <a:t>Results a bit worse than results reported in paper for all variants and all datasets</a:t>
             </a:r>
           </a:p>
           <a:p>
             <a:pPr>
-              <a:buFont typeface="Arial" panose="020B0604020202020204" pitchFamily="34" charset="0"/>
+              <a:buClr>
+                <a:srgbClr val="9E3611"/>
+              </a:buClr>
+              <a:buFont typeface="Arial" pitchFamily="2" charset="2"/>
               <a:buChar char="•"/>
             </a:pPr>
             <a:r>
-              <a:rPr lang="en-US" sz="2000" dirty="0"/>
-              <a:t>GAT can handle graphs with varying size and structure</a:t>
-            </a:r>
-            <a:r>
-              <a:rPr lang="en-US" sz="2200" dirty="0"/>
-              <a:t>.</a:t>
-            </a:r>
-          </a:p>
-        </p:txBody>
-      </p:sp>
-      <p:sp>
-        <p:nvSpPr>
-          <p:cNvPr id="6" name="Slide Number Placeholder 5">
+              <a:rPr lang="en-US" dirty="0"/>
+              <a:t>PPI dataset was very slow to run, so we only ran it once, but our architecture was wrong so we didn't record the </a:t>
+            </a:r>
+            <a:r>
+              <a:rPr lang="en-US" dirty="0" err="1"/>
+              <a:t>resuls</a:t>
+            </a:r>
+          </a:p>
+          <a:p>
+            <a:pPr>
+              <a:buClr>
+                <a:srgbClr val="9E3611"/>
+              </a:buClr>
+              <a:buFont typeface="Arial" pitchFamily="2" charset="2"/>
+              <a:buChar char="•"/>
+            </a:pPr>
+            <a:r>
+              <a:rPr lang="en-US" dirty="0" err="1"/>
+              <a:t>GATConv</a:t>
+            </a:r>
+            <a:r>
+              <a:rPr lang="en-US" dirty="0"/>
+              <a:t> accuracy means</a:t>
+            </a:r>
+          </a:p>
+          <a:p>
+            <a:pPr lvl="1">
+              <a:spcAft>
+                <a:spcPts val="0"/>
+              </a:spcAft>
+              <a:buClr>
+                <a:srgbClr val="9E3611"/>
+              </a:buClr>
+              <a:buFont typeface="Arial" pitchFamily="2" charset="2"/>
+              <a:buChar char="•"/>
+            </a:pPr>
+            <a:r>
+              <a:rPr lang="en-US" dirty="0" err="1"/>
+              <a:t>Citeseer</a:t>
+            </a:r>
+            <a:r>
+              <a:rPr lang="en-US" dirty="0"/>
+              <a:t> = 0.6675, Cora = 0.7926, </a:t>
+            </a:r>
+            <a:r>
+              <a:rPr lang="en-US" dirty="0" err="1"/>
+              <a:t>Pubmed</a:t>
+            </a:r>
+            <a:r>
+              <a:rPr lang="en-US" dirty="0"/>
+              <a:t> = 0.7682</a:t>
+            </a:r>
+          </a:p>
+          <a:p>
+            <a:pPr>
+              <a:buClr>
+                <a:srgbClr val="9E3611"/>
+              </a:buClr>
+              <a:buFont typeface="Arial" pitchFamily="2" charset="2"/>
+              <a:buChar char="•"/>
+            </a:pPr>
+            <a:r>
+              <a:rPr lang="en-US" dirty="0"/>
+              <a:t>GATv2Conv accuracy means</a:t>
+            </a:r>
+          </a:p>
+          <a:p>
+            <a:pPr lvl="1">
+              <a:spcAft>
+                <a:spcPts val="0"/>
+              </a:spcAft>
+              <a:buClr>
+                <a:srgbClr val="9E3611"/>
+              </a:buClr>
+              <a:buFont typeface="Arial" pitchFamily="2" charset="2"/>
+              <a:buChar char="•"/>
+            </a:pPr>
+            <a:r>
+              <a:rPr lang="en-US" dirty="0" err="1"/>
+              <a:t>Citeseer</a:t>
+            </a:r>
+            <a:r>
+              <a:rPr lang="en-US" dirty="0"/>
+              <a:t> = 0.6648, Cora = 0.7859, </a:t>
+            </a:r>
+            <a:r>
+              <a:rPr lang="en-US" dirty="0" err="1"/>
+              <a:t>Pubmed</a:t>
+            </a:r>
+            <a:r>
+              <a:rPr lang="en-US" dirty="0"/>
+              <a:t> = 0.7754</a:t>
+            </a:r>
+          </a:p>
+          <a:p>
+            <a:pPr>
+              <a:buClr>
+                <a:srgbClr val="9E3611"/>
+              </a:buClr>
+              <a:buFont typeface="Arial" pitchFamily="2" charset="2"/>
+              <a:buChar char="•"/>
+            </a:pPr>
+            <a:r>
+              <a:rPr lang="en-US" dirty="0"/>
+              <a:t>GAT accuracy means</a:t>
+            </a:r>
+          </a:p>
+          <a:p>
+            <a:pPr lvl="1">
+              <a:spcAft>
+                <a:spcPts val="0"/>
+              </a:spcAft>
+              <a:buClr>
+                <a:srgbClr val="9E3611"/>
+              </a:buClr>
+              <a:buFont typeface="Arial" pitchFamily="2" charset="2"/>
+              <a:buChar char="•"/>
+            </a:pPr>
+            <a:r>
+              <a:rPr lang="en-US" dirty="0" err="1"/>
+              <a:t>Citeseer</a:t>
+            </a:r>
+            <a:r>
+              <a:rPr lang="en-US" dirty="0"/>
+              <a:t> = 0.6725, Cora = 0.7892, </a:t>
+            </a:r>
+            <a:r>
+              <a:rPr lang="en-US" dirty="0" err="1"/>
+              <a:t>Pubmed</a:t>
+            </a:r>
+            <a:r>
+              <a:rPr lang="en-US" dirty="0"/>
+              <a:t> = 0.7812</a:t>
+            </a:r>
+          </a:p>
+        </p:txBody>
+      </p:sp>
+      <p:sp>
+        <p:nvSpPr>
+          <p:cNvPr id="4" name="Slide Number Placeholder 3">
             <a:extLst>
               <a:ext uri="{FF2B5EF4-FFF2-40B4-BE49-F238E27FC236}">
-                <a16:creationId xmlns:a16="http://schemas.microsoft.com/office/drawing/2014/main" id="{A3E3E713-A070-42E3-60AF-E2F15FFACBEC}"/>
+                <a16:creationId xmlns:a16="http://schemas.microsoft.com/office/drawing/2014/main" id="{CAC65C63-159E-90F3-E488-68EB35B36C8F}"/>
               </a:ext>
             </a:extLst>
           </p:cNvPr>
@@ -8052,10 +6859,10 @@
       </p:sp>
       <p:pic>
         <p:nvPicPr>
-          <p:cNvPr id="3" name="Picture 2" descr="Illuminated server room panel">
+          <p:cNvPr id="3" name="Picture 4" descr="Chart&#10;&#10;Description automatically generated">
             <a:extLst>
               <a:ext uri="{FF2B5EF4-FFF2-40B4-BE49-F238E27FC236}">
-                <a16:creationId xmlns:a16="http://schemas.microsoft.com/office/drawing/2014/main" id="{BD85E323-E740-307F-E3DA-5159B4755561}"/>
+                <a16:creationId xmlns:a16="http://schemas.microsoft.com/office/drawing/2014/main" id="{67C44698-AA79-8AE2-68F5-AEFA60F85DB8}"/>
               </a:ext>
             </a:extLst>
           </p:cNvPr>
@@ -8066,13 +6873,14 @@
         </p:nvPicPr>
         <p:blipFill>
           <a:blip r:embed="rId2"/>
-          <a:srcRect l="20157" r="20157"/>
-          <a:stretch/>
+          <a:stretch>
+            <a:fillRect/>
+          </a:stretch>
         </p:blipFill>
         <p:spPr>
           <a:xfrm>
-            <a:off x="7872307" y="2193036"/>
-            <a:ext cx="3261974" cy="3639872"/>
+            <a:off x="5842660" y="2097547"/>
+            <a:ext cx="6355643" cy="4117266"/>
           </a:xfrm>
           <a:prstGeom prst="rect">
             <a:avLst/>
@@ -8082,7 +6890,7 @@
     </p:spTree>
     <p:extLst>
       <p:ext uri="{BB962C8B-B14F-4D97-AF65-F5344CB8AC3E}">
-        <p14:creationId xmlns:p14="http://schemas.microsoft.com/office/powerpoint/2010/main" val="1914574257"/>
+        <p14:creationId xmlns:p14="http://schemas.microsoft.com/office/powerpoint/2010/main" val="162146412"/>
       </p:ext>
     </p:extLst>
   </p:cSld>
@@ -8114,7 +6922,7 @@
           <p:cNvPr id="2" name="Title 1">
             <a:extLst>
               <a:ext uri="{FF2B5EF4-FFF2-40B4-BE49-F238E27FC236}">
-                <a16:creationId xmlns:a16="http://schemas.microsoft.com/office/drawing/2014/main" id="{2166409C-8181-C8EB-4B9E-20A533ECA892}"/>
+                <a16:creationId xmlns:a16="http://schemas.microsoft.com/office/drawing/2014/main" id="{373765C5-2827-BE79-C5F1-6605539F7100}"/>
               </a:ext>
             </a:extLst>
           </p:cNvPr>
@@ -8125,38 +6933,168 @@
             <p:ph type="title"/>
           </p:nvPr>
         </p:nvSpPr>
-        <p:spPr>
-          <a:xfrm>
-            <a:off x="1069848" y="484632"/>
-            <a:ext cx="10058400" cy="1609344"/>
-          </a:xfrm>
-        </p:spPr>
-        <p:txBody>
-          <a:bodyPr>
+        <p:spPr/>
+        <p:txBody>
+          <a:bodyPr/>
+          <a:lstStyle/>
+          <a:p>
+            <a:r>
+              <a:rPr lang="en-US" dirty="0"/>
+              <a:t>Ablations - architectures</a:t>
+            </a:r>
+          </a:p>
+        </p:txBody>
+      </p:sp>
+      <p:sp>
+        <p:nvSpPr>
+          <p:cNvPr id="3" name="Content Placeholder 2">
+            <a:extLst>
+              <a:ext uri="{FF2B5EF4-FFF2-40B4-BE49-F238E27FC236}">
+                <a16:creationId xmlns:a16="http://schemas.microsoft.com/office/drawing/2014/main" id="{6EE37908-6A27-66B4-D58D-EFE67320F81B}"/>
+              </a:ext>
+            </a:extLst>
+          </p:cNvPr>
+          <p:cNvSpPr>
+            <a:spLocks noGrp="1"/>
+          </p:cNvSpPr>
+          <p:nvPr>
+            <p:ph idx="1"/>
+          </p:nvPr>
+        </p:nvSpPr>
+        <p:spPr/>
+        <p:txBody>
+          <a:bodyPr vert="horz" lIns="91440" tIns="45720" rIns="91440" bIns="45720" rtlCol="0" anchor="t">
             <a:normAutofit/>
           </a:bodyPr>
           <a:lstStyle/>
           <a:p>
+            <a:pPr>
+              <a:buFont typeface="Arial" pitchFamily="2" charset="2"/>
+              <a:buChar char="•"/>
+            </a:pPr>
             <a:r>
               <a:rPr lang="en-US" dirty="0"/>
-              <a:t>Original paper implementation </a:t>
-            </a:r>
-            <a:br>
+              <a:t>Single-layer GAT model, 8 heads, dropout with p = 0.6, L2 regularization with </a:t>
+            </a:r>
+            <a:r>
+              <a:rPr lang="en-US" dirty="0" err="1"/>
+              <a:t>with</a:t>
+            </a:r>
+            <a:r>
               <a:rPr lang="en-US" dirty="0"/>
-            </a:br>
+              <a:t> lambda = 0.0005, and </a:t>
+            </a:r>
+            <a:r>
+              <a:rPr lang="en-US" dirty="0" err="1"/>
+              <a:t>softmax</a:t>
+            </a:r>
             <a:r>
               <a:rPr lang="en-US" dirty="0"/>
-              <a:t>- background and problem</a:t>
-            </a:r>
-          </a:p>
-        </p:txBody>
-      </p:sp>
-      <p:sp>
-        <p:nvSpPr>
-          <p:cNvPr id="42" name="Content Placeholder 2">
+              <a:t> activation function</a:t>
+            </a:r>
+          </a:p>
+          <a:p>
+            <a:pPr>
+              <a:buClr>
+                <a:srgbClr val="9E3611"/>
+              </a:buClr>
+              <a:buFont typeface="Arial" pitchFamily="2" charset="2"/>
+              <a:buChar char="•"/>
+            </a:pPr>
+            <a:r>
+              <a:rPr lang="en-US" dirty="0"/>
+              <a:t>Same as above, with ELU followed by </a:t>
+            </a:r>
+            <a:r>
+              <a:rPr lang="en-US" dirty="0" err="1"/>
+              <a:t>softmax</a:t>
+            </a:r>
+            <a:r>
+              <a:rPr lang="en-US" dirty="0"/>
+              <a:t> instead of just </a:t>
+            </a:r>
+            <a:r>
+              <a:rPr lang="en-US" dirty="0" err="1"/>
+              <a:t>softmax</a:t>
+            </a:r>
+          </a:p>
+          <a:p>
+            <a:pPr>
+              <a:buClr>
+                <a:srgbClr val="9E3611"/>
+              </a:buClr>
+              <a:buFont typeface="Arial" pitchFamily="2" charset="2"/>
+              <a:buChar char="•"/>
+            </a:pPr>
+            <a:r>
+              <a:rPr lang="en-US" dirty="0"/>
+              <a:t>Three-layer GAT</a:t>
+            </a:r>
+          </a:p>
+          <a:p>
+            <a:pPr lvl="1">
+              <a:spcAft>
+                <a:spcPts val="0"/>
+              </a:spcAft>
+              <a:buClr>
+                <a:srgbClr val="9E3611"/>
+              </a:buClr>
+              <a:buFont typeface="Arial" pitchFamily="2" charset="2"/>
+              <a:buChar char="•"/>
+            </a:pPr>
+            <a:r>
+              <a:rPr lang="en-US" dirty="0"/>
+              <a:t>First two layers have 8 heads, project data to 8 dimensions, have ELU activation</a:t>
+            </a:r>
+          </a:p>
+          <a:p>
+            <a:pPr lvl="1">
+              <a:spcAft>
+                <a:spcPts val="0"/>
+              </a:spcAft>
+              <a:buClr>
+                <a:srgbClr val="9E3611"/>
+              </a:buClr>
+              <a:buFont typeface="Arial" pitchFamily="2" charset="2"/>
+              <a:buChar char="•"/>
+            </a:pPr>
+            <a:r>
+              <a:rPr lang="en-US" dirty="0"/>
+              <a:t>Third layer has 1 head and uses </a:t>
+            </a:r>
+            <a:r>
+              <a:rPr lang="en-US" dirty="0" err="1"/>
+              <a:t>softmax</a:t>
+            </a:r>
+            <a:r>
+              <a:rPr lang="en-US" dirty="0"/>
+              <a:t> activation</a:t>
+            </a:r>
+          </a:p>
+          <a:p>
+            <a:pPr lvl="1">
+              <a:spcAft>
+                <a:spcPts val="0"/>
+              </a:spcAft>
+              <a:buClr>
+                <a:srgbClr val="9E3611"/>
+              </a:buClr>
+              <a:buFont typeface="Arial" pitchFamily="2" charset="2"/>
+              <a:buChar char="•"/>
+            </a:pPr>
+            <a:r>
+              <a:rPr lang="en-US" dirty="0"/>
+              <a:t>All layers use dropout with p = 0.6 and L2 regularization with lambda = 0.0005</a:t>
+            </a:r>
+          </a:p>
+        </p:txBody>
+      </p:sp>
+      <p:sp>
+        <p:nvSpPr>
+          <p:cNvPr id="4" name="Slide Number Placeholder 3">
             <a:extLst>
               <a:ext uri="{FF2B5EF4-FFF2-40B4-BE49-F238E27FC236}">
-                <a16:creationId xmlns:a16="http://schemas.microsoft.com/office/drawing/2014/main" id="{1FD71070-A4EC-42D4-020D-ACA1B2467EA0}"/>
+                <a16:creationId xmlns:a16="http://schemas.microsoft.com/office/drawing/2014/main" id="{00F8FB9E-688E-FDE0-FD3B-90BD22168292}"/>
               </a:ext>
             </a:extLst>
           </p:cNvPr>
@@ -8164,147 +7102,27 @@
             <a:spLocks noGrp="1"/>
           </p:cNvSpPr>
           <p:nvPr>
-            <p:ph idx="1"/>
-          </p:nvPr>
-        </p:nvSpPr>
-        <p:spPr>
-          <a:xfrm>
-            <a:off x="1069847" y="2121408"/>
-            <a:ext cx="6482419" cy="4050792"/>
-          </a:xfrm>
-        </p:spPr>
-        <p:txBody>
-          <a:bodyPr>
-            <a:normAutofit lnSpcReduction="10000"/>
-          </a:bodyPr>
+            <p:ph type="sldNum" sz="quarter" idx="12"/>
+          </p:nvPr>
+        </p:nvSpPr>
+        <p:spPr/>
+        <p:txBody>
+          <a:bodyPr/>
           <a:lstStyle/>
           <a:p>
-            <a:pPr marL="0" indent="0">
-              <a:buNone/>
-            </a:pPr>
-            <a:r>
-              <a:rPr lang="en-US" dirty="0"/>
-              <a:t>GATs were proposed to overcome limitations of other graph neural network architectures, such as GCNs, GraphSAGE, and DeepWalk. </a:t>
-            </a:r>
-          </a:p>
-          <a:p>
-            <a:pPr marL="0" indent="0">
-              <a:buNone/>
-            </a:pPr>
-            <a:r>
-              <a:rPr lang="en-US" dirty="0"/>
-              <a:t>These limitations included:</a:t>
-            </a:r>
-          </a:p>
-          <a:p>
-            <a:r>
-              <a:rPr lang="en-US" dirty="0"/>
-              <a:t>Inability to operate on arbitrarily structured graphs, </a:t>
-            </a:r>
-          </a:p>
-          <a:p>
-            <a:r>
-              <a:rPr lang="en-US" dirty="0"/>
-              <a:t>Need to sample from input graphs, learning separate weight matrices for different node degrees, and </a:t>
-            </a:r>
-          </a:p>
-          <a:p>
-            <a:r>
-              <a:rPr lang="en-US" dirty="0"/>
-              <a:t>Inability to parallelize across nodes.</a:t>
-            </a:r>
-          </a:p>
-          <a:p>
-            <a:pPr marL="0" indent="0">
-              <a:buNone/>
-            </a:pPr>
-            <a:r>
-              <a:rPr lang="en-US" dirty="0"/>
-              <a:t>GATs offer a solution to these limitations and allow for more efficient and effective processing of graph-structured data.</a:t>
-            </a:r>
-            <a:endParaRPr lang="en-US" sz="2200" dirty="0"/>
-          </a:p>
-        </p:txBody>
-      </p:sp>
-      <p:sp>
-        <p:nvSpPr>
-          <p:cNvPr id="6" name="Slide Number Placeholder 5">
-            <a:extLst>
-              <a:ext uri="{FF2B5EF4-FFF2-40B4-BE49-F238E27FC236}">
-                <a16:creationId xmlns:a16="http://schemas.microsoft.com/office/drawing/2014/main" id="{A3E3E713-A070-42E3-60AF-E2F15FFACBEC}"/>
-              </a:ext>
-            </a:extLst>
-          </p:cNvPr>
-          <p:cNvSpPr>
-            <a:spLocks noGrp="1"/>
-          </p:cNvSpPr>
-          <p:nvPr>
-            <p:ph type="sldNum" sz="quarter" idx="12"/>
-          </p:nvPr>
-        </p:nvSpPr>
-        <p:spPr>
-          <a:xfrm>
-            <a:off x="11311128" y="6272784"/>
-            <a:ext cx="640080" cy="365125"/>
-          </a:xfrm>
-        </p:spPr>
-        <p:txBody>
-          <a:bodyPr>
-            <a:normAutofit/>
-          </a:bodyPr>
-          <a:lstStyle/>
-          <a:p>
-            <a:pPr>
-              <a:spcAft>
-                <a:spcPts val="600"/>
-              </a:spcAft>
-            </a:pPr>
             <a:fld id="{D57F1E4F-1CFF-5643-939E-217C01CDF565}" type="slidenum">
               <a:rPr lang="en-US" smtClean="0"/>
-              <a:pPr>
-                <a:spcAft>
-                  <a:spcPts val="600"/>
-                </a:spcAft>
-              </a:pPr>
+              <a:pPr/>
               <a:t>6</a:t>
             </a:fld>
-            <a:endParaRPr lang="en-US"/>
-          </a:p>
-        </p:txBody>
-      </p:sp>
-      <p:pic>
-        <p:nvPicPr>
-          <p:cNvPr id="3" name="Picture 2" descr="Illuminated server room panel">
-            <a:extLst>
-              <a:ext uri="{FF2B5EF4-FFF2-40B4-BE49-F238E27FC236}">
-                <a16:creationId xmlns:a16="http://schemas.microsoft.com/office/drawing/2014/main" id="{BD85E323-E740-307F-E3DA-5159B4755561}"/>
-              </a:ext>
-            </a:extLst>
-          </p:cNvPr>
-          <p:cNvPicPr>
-            <a:picLocks noChangeAspect="1"/>
-          </p:cNvPicPr>
-          <p:nvPr/>
-        </p:nvPicPr>
-        <p:blipFill>
-          <a:blip r:embed="rId2"/>
-          <a:srcRect l="20157" r="20157"/>
-          <a:stretch/>
-        </p:blipFill>
-        <p:spPr>
-          <a:xfrm>
-            <a:off x="7872307" y="2193036"/>
-            <a:ext cx="3261974" cy="3639872"/>
-          </a:xfrm>
-          <a:prstGeom prst="rect">
-            <a:avLst/>
-          </a:prstGeom>
-        </p:spPr>
-      </p:pic>
+            <a:endParaRPr lang="en-US" dirty="0"/>
+          </a:p>
+        </p:txBody>
+      </p:sp>
     </p:spTree>
     <p:extLst>
       <p:ext uri="{BB962C8B-B14F-4D97-AF65-F5344CB8AC3E}">
-        <p14:creationId xmlns:p14="http://schemas.microsoft.com/office/powerpoint/2010/main" val="1618823012"/>
+        <p14:creationId xmlns:p14="http://schemas.microsoft.com/office/powerpoint/2010/main" val="2427723341"/>
       </p:ext>
     </p:extLst>
   </p:cSld>
@@ -8336,7 +7154,7 @@
           <p:cNvPr id="2" name="Title 1">
             <a:extLst>
               <a:ext uri="{FF2B5EF4-FFF2-40B4-BE49-F238E27FC236}">
-                <a16:creationId xmlns:a16="http://schemas.microsoft.com/office/drawing/2014/main" id="{2166409C-8181-C8EB-4B9E-20A533ECA892}"/>
+                <a16:creationId xmlns:a16="http://schemas.microsoft.com/office/drawing/2014/main" id="{373765C5-2827-BE79-C5F1-6605539F7100}"/>
               </a:ext>
             </a:extLst>
           </p:cNvPr>
@@ -8347,38 +7165,242 @@
             <p:ph type="title"/>
           </p:nvPr>
         </p:nvSpPr>
+        <p:spPr/>
+        <p:txBody>
+          <a:bodyPr/>
+          <a:lstStyle/>
+          <a:p>
+            <a:r>
+              <a:rPr lang="en-US" dirty="0"/>
+              <a:t>Ablations - results</a:t>
+            </a:r>
+          </a:p>
+        </p:txBody>
+      </p:sp>
+      <p:sp>
+        <p:nvSpPr>
+          <p:cNvPr id="3" name="Content Placeholder 2">
+            <a:extLst>
+              <a:ext uri="{FF2B5EF4-FFF2-40B4-BE49-F238E27FC236}">
+                <a16:creationId xmlns:a16="http://schemas.microsoft.com/office/drawing/2014/main" id="{6EE37908-6A27-66B4-D58D-EFE67320F81B}"/>
+              </a:ext>
+            </a:extLst>
+          </p:cNvPr>
+          <p:cNvSpPr>
+            <a:spLocks noGrp="1"/>
+          </p:cNvSpPr>
+          <p:nvPr>
+            <p:ph idx="1"/>
+          </p:nvPr>
+        </p:nvSpPr>
         <p:spPr>
           <a:xfrm>
-            <a:off x="1069848" y="484632"/>
-            <a:ext cx="10058400" cy="1609344"/>
+            <a:off x="1069848" y="2101616"/>
+            <a:ext cx="3903024" cy="4070584"/>
           </a:xfrm>
         </p:spPr>
         <p:txBody>
-          <a:bodyPr>
+          <a:bodyPr vert="horz" lIns="91440" tIns="45720" rIns="91440" bIns="45720" rtlCol="0" anchor="t">
             <a:normAutofit/>
           </a:bodyPr>
           <a:lstStyle/>
           <a:p>
+            <a:pPr>
+              <a:buFont typeface="Arial" pitchFamily="2" charset="2"/>
+              <a:buChar char="•"/>
+            </a:pPr>
             <a:r>
               <a:rPr lang="en-US" dirty="0"/>
-              <a:t>Original paper implementation </a:t>
-            </a:r>
-            <a:br>
+              <a:t>Single-layer GAT 1</a:t>
+            </a:r>
+          </a:p>
+          <a:p>
+            <a:pPr lvl="1">
+              <a:buClr>
+                <a:srgbClr val="9E3611"/>
+              </a:buClr>
+              <a:buFont typeface="Arial" pitchFamily="2" charset="2"/>
+              <a:buChar char="•"/>
+            </a:pPr>
+            <a:r>
+              <a:rPr lang="en-US" dirty="0" err="1"/>
+              <a:t>Citeseer</a:t>
+            </a:r>
+            <a:r>
               <a:rPr lang="en-US" dirty="0"/>
-            </a:br>
+              <a:t> accuracy: 0.6270</a:t>
+            </a:r>
+          </a:p>
+          <a:p>
+            <a:pPr lvl="1">
+              <a:buClr>
+                <a:srgbClr val="9E3611"/>
+              </a:buClr>
+              <a:buFont typeface="Arial" pitchFamily="2" charset="2"/>
+              <a:buChar char="•"/>
+            </a:pPr>
             <a:r>
               <a:rPr lang="en-US" dirty="0"/>
-              <a:t>- Model &amp; DATA description</a:t>
-            </a:r>
-          </a:p>
-        </p:txBody>
-      </p:sp>
-      <p:sp>
-        <p:nvSpPr>
-          <p:cNvPr id="42" name="Content Placeholder 2">
+              <a:t>Cora accuracy: 0.7320</a:t>
+            </a:r>
+          </a:p>
+          <a:p>
+            <a:pPr lvl="1">
+              <a:buClr>
+                <a:srgbClr val="9E3611"/>
+              </a:buClr>
+              <a:buFont typeface="Arial" pitchFamily="2" charset="2"/>
+              <a:buChar char="•"/>
+            </a:pPr>
+            <a:r>
+              <a:rPr lang="en-US" dirty="0" err="1"/>
+              <a:t>Pubmed</a:t>
+            </a:r>
+            <a:r>
+              <a:rPr lang="en-US" dirty="0"/>
+              <a:t> accuracy: 0.7040</a:t>
+            </a:r>
+          </a:p>
+          <a:p>
+            <a:pPr>
+              <a:buClr>
+                <a:srgbClr val="9E3611"/>
+              </a:buClr>
+              <a:buFont typeface="Arial" pitchFamily="2" charset="2"/>
+              <a:buChar char="•"/>
+            </a:pPr>
+            <a:r>
+              <a:rPr lang="en-US" dirty="0"/>
+              <a:t>Single-layer GAT 2</a:t>
+            </a:r>
+          </a:p>
+          <a:p>
+            <a:pPr lvl="1">
+              <a:spcAft>
+                <a:spcPts val="0"/>
+              </a:spcAft>
+              <a:buClr>
+                <a:srgbClr val="9E3611"/>
+              </a:buClr>
+              <a:buFont typeface="Arial" pitchFamily="2" charset="2"/>
+              <a:buChar char="•"/>
+            </a:pPr>
+            <a:r>
+              <a:rPr lang="en-US" dirty="0" err="1"/>
+              <a:t>Citeseer</a:t>
+            </a:r>
+            <a:r>
+              <a:rPr lang="en-US" dirty="0"/>
+              <a:t> accuracy: 0.6490</a:t>
+            </a:r>
+          </a:p>
+          <a:p>
+            <a:pPr lvl="1">
+              <a:buClr>
+                <a:srgbClr val="9E3611"/>
+              </a:buClr>
+              <a:buFont typeface="Arial" pitchFamily="2" charset="2"/>
+              <a:buChar char="•"/>
+            </a:pPr>
+            <a:r>
+              <a:rPr lang="en-US" dirty="0"/>
+              <a:t>Cora accuracy: 0.7600</a:t>
+            </a:r>
+          </a:p>
+          <a:p>
+            <a:pPr lvl="1">
+              <a:buClr>
+                <a:srgbClr val="9E3611"/>
+              </a:buClr>
+              <a:buFont typeface="Arial" pitchFamily="2" charset="2"/>
+              <a:buChar char="•"/>
+            </a:pPr>
+            <a:r>
+              <a:rPr lang="en-US" dirty="0" err="1"/>
+              <a:t>Pubmed</a:t>
+            </a:r>
+            <a:r>
+              <a:rPr lang="en-US" dirty="0"/>
+              <a:t> accuracy: 0.7160</a:t>
+            </a:r>
+          </a:p>
+          <a:p>
+            <a:pPr>
+              <a:buClr>
+                <a:srgbClr val="9E3611"/>
+              </a:buClr>
+              <a:buFont typeface="Arial" pitchFamily="2" charset="2"/>
+              <a:buChar char="•"/>
+            </a:pPr>
+            <a:r>
+              <a:rPr lang="en-US" dirty="0"/>
+              <a:t>Three-layer GAT</a:t>
+            </a:r>
+          </a:p>
+          <a:p>
+            <a:pPr lvl="1">
+              <a:spcAft>
+                <a:spcPts val="0"/>
+              </a:spcAft>
+              <a:buClr>
+                <a:srgbClr val="9E3611"/>
+              </a:buClr>
+              <a:buFont typeface="Arial" pitchFamily="2" charset="2"/>
+              <a:buChar char="•"/>
+            </a:pPr>
+            <a:r>
+              <a:rPr lang="en-US" dirty="0" err="1"/>
+              <a:t>Citeseer</a:t>
+            </a:r>
+            <a:r>
+              <a:rPr lang="en-US" dirty="0"/>
+              <a:t> accuracy: 0.6650</a:t>
+            </a:r>
+          </a:p>
+          <a:p>
+            <a:pPr lvl="1">
+              <a:spcAft>
+                <a:spcPts val="0"/>
+              </a:spcAft>
+              <a:buClr>
+                <a:srgbClr val="9E3611"/>
+              </a:buClr>
+              <a:buFont typeface="Arial" pitchFamily="2" charset="2"/>
+              <a:buChar char="•"/>
+            </a:pPr>
+            <a:r>
+              <a:rPr lang="en-US" dirty="0"/>
+              <a:t>Cora accuracy: 0.7930</a:t>
+            </a:r>
+          </a:p>
+          <a:p>
+            <a:pPr lvl="1">
+              <a:spcAft>
+                <a:spcPts val="0"/>
+              </a:spcAft>
+              <a:buClr>
+                <a:srgbClr val="9E3611"/>
+              </a:buClr>
+              <a:buFont typeface="Arial" pitchFamily="2" charset="2"/>
+              <a:buChar char="•"/>
+            </a:pPr>
+            <a:r>
+              <a:rPr lang="en-US" dirty="0" err="1"/>
+              <a:t>Pubmed</a:t>
+            </a:r>
+            <a:r>
+              <a:rPr lang="en-US" dirty="0"/>
+              <a:t> accuracy: 0.7660</a:t>
+            </a:r>
+          </a:p>
+        </p:txBody>
+      </p:sp>
+      <p:sp>
+        <p:nvSpPr>
+          <p:cNvPr id="4" name="Slide Number Placeholder 3">
             <a:extLst>
               <a:ext uri="{FF2B5EF4-FFF2-40B4-BE49-F238E27FC236}">
-                <a16:creationId xmlns:a16="http://schemas.microsoft.com/office/drawing/2014/main" id="{1FD71070-A4EC-42D4-020D-ACA1B2467EA0}"/>
+                <a16:creationId xmlns:a16="http://schemas.microsoft.com/office/drawing/2014/main" id="{00F8FB9E-688E-FDE0-FD3B-90BD22168292}"/>
               </a:ext>
             </a:extLst>
           </p:cNvPr>
@@ -8386,631 +7408,357 @@
             <a:spLocks noGrp="1"/>
           </p:cNvSpPr>
           <p:nvPr>
-            <p:ph idx="1"/>
-          </p:nvPr>
-        </p:nvSpPr>
-        <p:spPr>
-          <a:xfrm>
-            <a:off x="1069847" y="2121408"/>
-            <a:ext cx="6482419" cy="4050792"/>
-          </a:xfrm>
-        </p:spPr>
-        <p:txBody>
-          <a:bodyPr>
-            <a:normAutofit fontScale="77500" lnSpcReduction="20000"/>
-          </a:bodyPr>
+            <p:ph type="sldNum" sz="quarter" idx="12"/>
+          </p:nvPr>
+        </p:nvSpPr>
+        <p:spPr/>
+        <p:txBody>
+          <a:bodyPr/>
           <a:lstStyle/>
           <a:p>
-            <a:pPr marL="0" indent="0">
-              <a:buNone/>
-            </a:pPr>
-            <a:r>
-              <a:rPr lang="en-US" dirty="0"/>
-              <a:t>The GAT model used four datasets, including Cora, Citeseer, Pubmed, and Protein-Protein Interaction (PPI), with varying features, classes, and sparsity.</a:t>
-            </a:r>
-          </a:p>
-          <a:p>
-            <a:r>
-              <a:rPr lang="en-US" dirty="0"/>
-              <a:t>For Cora and Citeseer, </a:t>
-            </a:r>
-          </a:p>
-          <a:p>
-            <a:pPr lvl="1"/>
-            <a:r>
-              <a:rPr lang="en-US" dirty="0"/>
-              <a:t>2-layer GAT with 8 attention heads in the first layer and 1 attention head in the second layer,</a:t>
-            </a:r>
-          </a:p>
-          <a:p>
-            <a:pPr lvl="1"/>
-            <a:r>
-              <a:rPr lang="en-US" dirty="0"/>
-              <a:t>L2 regularization with lambda = 0.0005</a:t>
-            </a:r>
-          </a:p>
-          <a:p>
-            <a:pPr lvl="1"/>
-            <a:r>
-              <a:rPr lang="en-US" dirty="0"/>
-              <a:t>dropout with p = 0.6 to prevent overfitting</a:t>
-            </a:r>
-          </a:p>
-          <a:p>
-            <a:pPr lvl="1"/>
-            <a:r>
-              <a:rPr lang="en-US" dirty="0"/>
-              <a:t>Achieved classification accuracies ~ 83.0% (Cora) and 72.5% (Citeseer).</a:t>
-            </a:r>
-          </a:p>
-          <a:p>
-            <a:r>
-              <a:rPr lang="en-US" dirty="0"/>
-              <a:t>For PubMed, </a:t>
-            </a:r>
-          </a:p>
-          <a:p>
-            <a:pPr lvl="1"/>
-            <a:r>
-              <a:rPr lang="en-US" dirty="0"/>
-              <a:t>2-layer GAT with 8 attention heads in both first layer and second layers</a:t>
-            </a:r>
-          </a:p>
-          <a:p>
-            <a:pPr lvl="1"/>
-            <a:r>
-              <a:rPr lang="en-US" dirty="0"/>
-              <a:t>L2 regularization coefficient of 0.001</a:t>
-            </a:r>
-          </a:p>
-          <a:p>
-            <a:pPr lvl="1"/>
-            <a:r>
-              <a:rPr lang="en-US" dirty="0"/>
-              <a:t>Achieved an accuracy ~ 79%. </a:t>
-            </a:r>
-          </a:p>
-          <a:p>
-            <a:r>
-              <a:rPr lang="en-US" dirty="0"/>
-              <a:t>For protein-protein interaction, </a:t>
-            </a:r>
-          </a:p>
-          <a:p>
-            <a:pPr lvl="1"/>
-            <a:r>
-              <a:rPr lang="en-US" dirty="0"/>
-              <a:t>3-layer GAT with 4 attention heads in the first two layers and 6 attention heads in the third layer </a:t>
-            </a:r>
-          </a:p>
-          <a:p>
-            <a:pPr lvl="1"/>
-            <a:r>
-              <a:rPr lang="en-US" dirty="0"/>
-              <a:t>Achieving a micro-averaged F1 score of approximately 0.973.</a:t>
-            </a:r>
-            <a:endParaRPr lang="en-US" sz="2000" dirty="0"/>
-          </a:p>
-        </p:txBody>
-      </p:sp>
-      <p:sp>
-        <p:nvSpPr>
-          <p:cNvPr id="6" name="Slide Number Placeholder 5">
+            <a:fld id="{D57F1E4F-1CFF-5643-939E-217C01CDF565}" type="slidenum">
+              <a:rPr lang="en-US" smtClean="0"/>
+              <a:pPr/>
+              <a:t>7</a:t>
+            </a:fld>
+            <a:endParaRPr lang="en-US" dirty="0"/>
+          </a:p>
+        </p:txBody>
+      </p:sp>
+      <p:sp>
+        <p:nvSpPr>
+          <p:cNvPr id="14" name="Content Placeholder 2">
             <a:extLst>
               <a:ext uri="{FF2B5EF4-FFF2-40B4-BE49-F238E27FC236}">
-                <a16:creationId xmlns:a16="http://schemas.microsoft.com/office/drawing/2014/main" id="{A3E3E713-A070-42E3-60AF-E2F15FFACBEC}"/>
+                <a16:creationId xmlns:a16="http://schemas.microsoft.com/office/drawing/2014/main" id="{978C9513-85F9-E848-4A19-4EDA99319AF3}"/>
               </a:ext>
             </a:extLst>
           </p:cNvPr>
-          <p:cNvSpPr>
-            <a:spLocks noGrp="1"/>
-          </p:cNvSpPr>
-          <p:nvPr>
-            <p:ph type="sldNum" sz="quarter" idx="12"/>
-          </p:nvPr>
+          <p:cNvSpPr txBox="1">
+            <a:spLocks/>
+          </p:cNvSpPr>
+          <p:nvPr/>
         </p:nvSpPr>
         <p:spPr>
           <a:xfrm>
-            <a:off x="11311128" y="6272784"/>
-            <a:ext cx="640080" cy="365125"/>
-          </a:xfrm>
-        </p:spPr>
-        <p:txBody>
-          <a:bodyPr>
-            <a:normAutofit/>
-          </a:bodyPr>
-          <a:lstStyle/>
-          <a:p>
-            <a:pPr>
-              <a:spcAft>
-                <a:spcPts val="600"/>
-              </a:spcAft>
-            </a:pPr>
-            <a:fld id="{D57F1E4F-1CFF-5643-939E-217C01CDF565}" type="slidenum">
-              <a:rPr lang="en-US" smtClean="0"/>
-              <a:pPr>
-                <a:spcAft>
-                  <a:spcPts val="600"/>
-                </a:spcAft>
-              </a:pPr>
-              <a:t>7</a:t>
-            </a:fld>
-            <a:endParaRPr lang="en-US"/>
-          </a:p>
-        </p:txBody>
-      </p:sp>
-      <p:pic>
-        <p:nvPicPr>
-          <p:cNvPr id="3" name="Picture 2">
-            <a:extLst>
-              <a:ext uri="{FF2B5EF4-FFF2-40B4-BE49-F238E27FC236}">
-                <a16:creationId xmlns:a16="http://schemas.microsoft.com/office/drawing/2014/main" id="{BD85E323-E740-307F-E3DA-5159B4755561}"/>
-              </a:ext>
-            </a:extLst>
-          </p:cNvPr>
-          <p:cNvPicPr>
-            <a:picLocks noChangeAspect="1"/>
-          </p:cNvPicPr>
-          <p:nvPr/>
-        </p:nvPicPr>
-        <p:blipFill>
-          <a:blip r:embed="rId2"/>
-          <a:srcRect l="135" r="135"/>
-          <a:stretch/>
-        </p:blipFill>
-        <p:spPr>
-          <a:xfrm>
-            <a:off x="7872307" y="2193036"/>
-            <a:ext cx="3261974" cy="3639872"/>
+            <a:off x="6101027" y="2105574"/>
+            <a:ext cx="3903024" cy="4070584"/>
           </a:xfrm>
           <a:prstGeom prst="rect">
             <a:avLst/>
           </a:prstGeom>
         </p:spPr>
-      </p:pic>
+        <p:txBody>
+          <a:bodyPr vert="horz" lIns="91440" tIns="45720" rIns="91440" bIns="45720" rtlCol="0" anchor="t">
+            <a:normAutofit/>
+          </a:bodyPr>
+          <a:lstStyle>
+            <a:lvl1pPr marL="182880" indent="-182880" algn="l" defTabSz="914400" rtl="0" eaLnBrk="1" latinLnBrk="0" hangingPunct="1">
+              <a:lnSpc>
+                <a:spcPct val="90000"/>
+              </a:lnSpc>
+              <a:spcBef>
+                <a:spcPts val="1200"/>
+              </a:spcBef>
+              <a:buClr>
+                <a:schemeClr val="accent1">
+                  <a:lumMod val="75000"/>
+                </a:schemeClr>
+              </a:buClr>
+              <a:buSzPct val="85000"/>
+              <a:buFont typeface="Wingdings" pitchFamily="2" charset="2"/>
+              <a:buChar char="§"/>
+              <a:defRPr sz="2000" kern="1200">
+                <a:solidFill>
+                  <a:schemeClr val="tx1"/>
+                </a:solidFill>
+                <a:latin typeface="+mn-lt"/>
+                <a:ea typeface="+mn-ea"/>
+                <a:cs typeface="+mn-cs"/>
+              </a:defRPr>
+            </a:lvl1pPr>
+            <a:lvl2pPr marL="457200" indent="-182880" algn="l" defTabSz="914400" rtl="0" eaLnBrk="1" latinLnBrk="0" hangingPunct="1">
+              <a:lnSpc>
+                <a:spcPct val="90000"/>
+              </a:lnSpc>
+              <a:spcBef>
+                <a:spcPts val="400"/>
+              </a:spcBef>
+              <a:spcAft>
+                <a:spcPts val="200"/>
+              </a:spcAft>
+              <a:buClr>
+                <a:schemeClr val="accent1">
+                  <a:lumMod val="75000"/>
+                </a:schemeClr>
+              </a:buClr>
+              <a:buSzPct val="85000"/>
+              <a:buFont typeface="Wingdings" pitchFamily="2" charset="2"/>
+              <a:buChar char="§"/>
+              <a:defRPr sz="1800" kern="1200">
+                <a:solidFill>
+                  <a:schemeClr val="tx1"/>
+                </a:solidFill>
+                <a:latin typeface="+mn-lt"/>
+                <a:ea typeface="+mn-ea"/>
+                <a:cs typeface="+mn-cs"/>
+              </a:defRPr>
+            </a:lvl2pPr>
+            <a:lvl3pPr marL="731520" indent="-182880" algn="l" defTabSz="914400" rtl="0" eaLnBrk="1" latinLnBrk="0" hangingPunct="1">
+              <a:lnSpc>
+                <a:spcPct val="90000"/>
+              </a:lnSpc>
+              <a:spcBef>
+                <a:spcPts val="400"/>
+              </a:spcBef>
+              <a:spcAft>
+                <a:spcPts val="200"/>
+              </a:spcAft>
+              <a:buClr>
+                <a:schemeClr val="accent1">
+                  <a:lumMod val="75000"/>
+                </a:schemeClr>
+              </a:buClr>
+              <a:buSzPct val="85000"/>
+              <a:buFont typeface="Wingdings" pitchFamily="2" charset="2"/>
+              <a:buChar char="§"/>
+              <a:defRPr sz="1600" kern="1200">
+                <a:solidFill>
+                  <a:schemeClr val="tx1"/>
+                </a:solidFill>
+                <a:latin typeface="+mn-lt"/>
+                <a:ea typeface="+mn-ea"/>
+                <a:cs typeface="+mn-cs"/>
+              </a:defRPr>
+            </a:lvl3pPr>
+            <a:lvl4pPr marL="1005840" indent="-182880" algn="l" defTabSz="914400" rtl="0" eaLnBrk="1" latinLnBrk="0" hangingPunct="1">
+              <a:lnSpc>
+                <a:spcPct val="90000"/>
+              </a:lnSpc>
+              <a:spcBef>
+                <a:spcPts val="400"/>
+              </a:spcBef>
+              <a:spcAft>
+                <a:spcPts val="200"/>
+              </a:spcAft>
+              <a:buClr>
+                <a:schemeClr val="accent1">
+                  <a:lumMod val="75000"/>
+                </a:schemeClr>
+              </a:buClr>
+              <a:buSzPct val="85000"/>
+              <a:buFont typeface="Wingdings" pitchFamily="2" charset="2"/>
+              <a:buChar char="§"/>
+              <a:defRPr sz="1600" kern="1200">
+                <a:solidFill>
+                  <a:schemeClr val="tx1"/>
+                </a:solidFill>
+                <a:latin typeface="+mn-lt"/>
+                <a:ea typeface="+mn-ea"/>
+                <a:cs typeface="+mn-cs"/>
+              </a:defRPr>
+            </a:lvl4pPr>
+            <a:lvl5pPr marL="1280160" indent="-182880" algn="l" defTabSz="914400" rtl="0" eaLnBrk="1" latinLnBrk="0" hangingPunct="1">
+              <a:lnSpc>
+                <a:spcPct val="90000"/>
+              </a:lnSpc>
+              <a:spcBef>
+                <a:spcPts val="400"/>
+              </a:spcBef>
+              <a:spcAft>
+                <a:spcPts val="200"/>
+              </a:spcAft>
+              <a:buClr>
+                <a:schemeClr val="accent1">
+                  <a:lumMod val="75000"/>
+                </a:schemeClr>
+              </a:buClr>
+              <a:buSzPct val="85000"/>
+              <a:buFont typeface="Wingdings" pitchFamily="2" charset="2"/>
+              <a:buChar char="§"/>
+              <a:defRPr sz="1600" kern="1200">
+                <a:solidFill>
+                  <a:schemeClr val="tx1"/>
+                </a:solidFill>
+                <a:latin typeface="+mn-lt"/>
+                <a:ea typeface="+mn-ea"/>
+                <a:cs typeface="+mn-cs"/>
+              </a:defRPr>
+            </a:lvl5pPr>
+            <a:lvl6pPr marL="1600000" indent="-228600" algn="l" defTabSz="914400" rtl="0" eaLnBrk="1" latinLnBrk="0" hangingPunct="1">
+              <a:lnSpc>
+                <a:spcPct val="90000"/>
+              </a:lnSpc>
+              <a:spcBef>
+                <a:spcPts val="400"/>
+              </a:spcBef>
+              <a:spcAft>
+                <a:spcPts val="200"/>
+              </a:spcAft>
+              <a:buClr>
+                <a:schemeClr val="accent1">
+                  <a:lumMod val="75000"/>
+                </a:schemeClr>
+              </a:buClr>
+              <a:buSzPct val="85000"/>
+              <a:buFont typeface="Wingdings" pitchFamily="2" charset="2"/>
+              <a:buChar char="§"/>
+              <a:defRPr sz="1600" kern="1200">
+                <a:solidFill>
+                  <a:schemeClr val="tx1"/>
+                </a:solidFill>
+                <a:latin typeface="+mn-lt"/>
+                <a:ea typeface="+mn-ea"/>
+                <a:cs typeface="+mn-cs"/>
+              </a:defRPr>
+            </a:lvl6pPr>
+            <a:lvl7pPr marL="1900000" indent="-228600" algn="l" defTabSz="914400" rtl="0" eaLnBrk="1" latinLnBrk="0" hangingPunct="1">
+              <a:lnSpc>
+                <a:spcPct val="90000"/>
+              </a:lnSpc>
+              <a:spcBef>
+                <a:spcPts val="400"/>
+              </a:spcBef>
+              <a:spcAft>
+                <a:spcPts val="200"/>
+              </a:spcAft>
+              <a:buClr>
+                <a:schemeClr val="accent1">
+                  <a:lumMod val="75000"/>
+                </a:schemeClr>
+              </a:buClr>
+              <a:buSzPct val="85000"/>
+              <a:buFont typeface="Wingdings" pitchFamily="2" charset="2"/>
+              <a:buChar char="§"/>
+              <a:defRPr sz="1600" kern="1200">
+                <a:solidFill>
+                  <a:schemeClr val="tx1"/>
+                </a:solidFill>
+                <a:latin typeface="+mn-lt"/>
+                <a:ea typeface="+mn-ea"/>
+                <a:cs typeface="+mn-cs"/>
+              </a:defRPr>
+            </a:lvl7pPr>
+            <a:lvl8pPr marL="2200000" indent="-228600" algn="l" defTabSz="914400" rtl="0" eaLnBrk="1" latinLnBrk="0" hangingPunct="1">
+              <a:lnSpc>
+                <a:spcPct val="90000"/>
+              </a:lnSpc>
+              <a:spcBef>
+                <a:spcPts val="400"/>
+              </a:spcBef>
+              <a:spcAft>
+                <a:spcPts val="200"/>
+              </a:spcAft>
+              <a:buClr>
+                <a:schemeClr val="accent1">
+                  <a:lumMod val="75000"/>
+                </a:schemeClr>
+              </a:buClr>
+              <a:buSzPct val="85000"/>
+              <a:buFont typeface="Wingdings" pitchFamily="2" charset="2"/>
+              <a:buChar char="§"/>
+              <a:defRPr sz="1600" kern="1200">
+                <a:solidFill>
+                  <a:schemeClr val="tx1"/>
+                </a:solidFill>
+                <a:latin typeface="+mn-lt"/>
+                <a:ea typeface="+mn-ea"/>
+                <a:cs typeface="+mn-cs"/>
+              </a:defRPr>
+            </a:lvl8pPr>
+            <a:lvl9pPr marL="2500000" indent="-228600" algn="l" defTabSz="914400" rtl="0" eaLnBrk="1" latinLnBrk="0" hangingPunct="1">
+              <a:lnSpc>
+                <a:spcPct val="90000"/>
+              </a:lnSpc>
+              <a:spcBef>
+                <a:spcPts val="400"/>
+              </a:spcBef>
+              <a:spcAft>
+                <a:spcPts val="200"/>
+              </a:spcAft>
+              <a:buClr>
+                <a:schemeClr val="accent1">
+                  <a:lumMod val="75000"/>
+                </a:schemeClr>
+              </a:buClr>
+              <a:buSzPct val="85000"/>
+              <a:buFont typeface="Wingdings" pitchFamily="2" charset="2"/>
+              <a:buChar char="§"/>
+              <a:defRPr sz="1600" kern="1200">
+                <a:solidFill>
+                  <a:schemeClr val="tx1"/>
+                </a:solidFill>
+                <a:latin typeface="+mn-lt"/>
+                <a:ea typeface="+mn-ea"/>
+                <a:cs typeface="+mn-cs"/>
+              </a:defRPr>
+            </a:lvl9pPr>
+          </a:lstStyle>
+          <a:p>
+            <a:pPr>
+              <a:buFont typeface="Arial,Sans-Serif" pitchFamily="2" charset="2"/>
+              <a:buChar char="•"/>
+            </a:pPr>
+            <a:r>
+              <a:rPr lang="en-US" sz="1900">
+                <a:ea typeface="+mn-lt"/>
+                <a:cs typeface="+mn-lt"/>
+              </a:rPr>
+              <a:t>Both single-layer GATs appear to perform worse than all three two-layer GATs from the replication</a:t>
+            </a:r>
+            <a:endParaRPr lang="en-US" sz="1900" dirty="0">
+              <a:ea typeface="+mn-lt"/>
+              <a:cs typeface="+mn-lt"/>
+            </a:endParaRPr>
+          </a:p>
+          <a:p>
+            <a:pPr>
+              <a:buClr>
+                <a:srgbClr val="9E3611"/>
+              </a:buClr>
+              <a:buFont typeface="Arial,Sans-Serif" pitchFamily="2" charset="2"/>
+              <a:buChar char="•"/>
+            </a:pPr>
+            <a:r>
+              <a:rPr lang="en-US" sz="1900">
+                <a:ea typeface="+mn-lt"/>
+                <a:cs typeface="+mn-lt"/>
+              </a:rPr>
+              <a:t>Second single-layer GAT seems to do a bit better than first single-layer GAT</a:t>
+            </a:r>
+          </a:p>
+          <a:p>
+            <a:pPr>
+              <a:buClr>
+                <a:srgbClr val="9E3611"/>
+              </a:buClr>
+              <a:buFont typeface="Arial,Sans-Serif" pitchFamily="2" charset="2"/>
+              <a:buChar char="•"/>
+            </a:pPr>
+            <a:r>
+              <a:rPr lang="en-US" sz="1900" dirty="0">
+                <a:ea typeface="+mn-lt"/>
+                <a:cs typeface="+mn-lt"/>
+              </a:rPr>
+              <a:t>Three-layer GAT seems to perform about equally to the two-layer GATs from the replication, perhaps a little bit better on Cora data</a:t>
+            </a:r>
+          </a:p>
+          <a:p>
+            <a:pPr>
+              <a:buClr>
+                <a:srgbClr val="9E3611"/>
+              </a:buClr>
+              <a:buFont typeface="Arial,Sans-Serif" pitchFamily="2" charset="2"/>
+              <a:buChar char="•"/>
+            </a:pPr>
+            <a:endParaRPr lang="en-US" sz="1900" dirty="0"/>
+          </a:p>
+        </p:txBody>
+      </p:sp>
     </p:spTree>
     <p:extLst>
       <p:ext uri="{BB962C8B-B14F-4D97-AF65-F5344CB8AC3E}">
-        <p14:creationId xmlns:p14="http://schemas.microsoft.com/office/powerpoint/2010/main" val="2373580699"/>
-      </p:ext>
-    </p:extLst>
-  </p:cSld>
-  <p:clrMapOvr>
-    <a:masterClrMapping/>
-  </p:clrMapOvr>
-</p:sld>
-</file>
-
-<file path=ppt/slides/slide8.xml><?xml version="1.0" encoding="utf-8"?>
-<p:sld xmlns:a="http://schemas.openxmlformats.org/drawingml/2006/main" xmlns:r="http://schemas.openxmlformats.org/officeDocument/2006/relationships" xmlns:p="http://schemas.openxmlformats.org/presentationml/2006/main">
-  <p:cSld>
-    <p:spTree>
-      <p:nvGrpSpPr>
-        <p:cNvPr id="1" name=""/>
-        <p:cNvGrpSpPr/>
-        <p:nvPr/>
-      </p:nvGrpSpPr>
-      <p:grpSpPr>
-        <a:xfrm>
-          <a:off x="0" y="0"/>
-          <a:ext cx="0" cy="0"/>
-          <a:chOff x="0" y="0"/>
-          <a:chExt cx="0" cy="0"/>
-        </a:xfrm>
-      </p:grpSpPr>
-      <p:sp>
-        <p:nvSpPr>
-          <p:cNvPr id="2" name="Title 1">
-            <a:extLst>
-              <a:ext uri="{FF2B5EF4-FFF2-40B4-BE49-F238E27FC236}">
-                <a16:creationId xmlns:a16="http://schemas.microsoft.com/office/drawing/2014/main" id="{2166409C-8181-C8EB-4B9E-20A533ECA892}"/>
-              </a:ext>
-            </a:extLst>
-          </p:cNvPr>
-          <p:cNvSpPr>
-            <a:spLocks noGrp="1"/>
-          </p:cNvSpPr>
-          <p:nvPr>
-            <p:ph type="title"/>
-          </p:nvPr>
-        </p:nvSpPr>
-        <p:spPr>
-          <a:xfrm>
-            <a:off x="1069848" y="484632"/>
-            <a:ext cx="10058400" cy="1609344"/>
-          </a:xfrm>
-        </p:spPr>
-        <p:txBody>
-          <a:bodyPr>
-            <a:normAutofit/>
-          </a:bodyPr>
-          <a:lstStyle/>
-          <a:p>
-            <a:r>
-              <a:rPr lang="en-US" dirty="0"/>
-              <a:t>Reproducing &amp; experimenting GAT </a:t>
-            </a:r>
-            <a:br>
-              <a:rPr lang="en-US" dirty="0"/>
-            </a:br>
-            <a:r>
-              <a:rPr lang="en-US" dirty="0"/>
-              <a:t>- Scope &amp; objective</a:t>
-            </a:r>
-          </a:p>
-        </p:txBody>
-      </p:sp>
-      <p:sp>
-        <p:nvSpPr>
-          <p:cNvPr id="42" name="Content Placeholder 2">
-            <a:extLst>
-              <a:ext uri="{FF2B5EF4-FFF2-40B4-BE49-F238E27FC236}">
-                <a16:creationId xmlns:a16="http://schemas.microsoft.com/office/drawing/2014/main" id="{1FD71070-A4EC-42D4-020D-ACA1B2467EA0}"/>
-              </a:ext>
-            </a:extLst>
-          </p:cNvPr>
-          <p:cNvSpPr>
-            <a:spLocks noGrp="1"/>
-          </p:cNvSpPr>
-          <p:nvPr>
-            <p:ph idx="1"/>
-          </p:nvPr>
-        </p:nvSpPr>
-        <p:spPr>
-          <a:xfrm>
-            <a:off x="1069847" y="2121408"/>
-            <a:ext cx="6482419" cy="4050792"/>
-          </a:xfrm>
-        </p:spPr>
-        <p:txBody>
-          <a:bodyPr>
-            <a:normAutofit/>
-          </a:bodyPr>
-          <a:lstStyle/>
-          <a:p>
-            <a:pPr marL="0" indent="0">
-              <a:buNone/>
-            </a:pPr>
-            <a:r>
-              <a:rPr lang="en-US" dirty="0"/>
-              <a:t>Reproducing Graph Attention Networks (GATs) results using Cora, Citeseer, PubMed, and Protein-protein interaction datasets.</a:t>
-            </a:r>
-          </a:p>
-          <a:p>
-            <a:r>
-              <a:rPr lang="en-US" dirty="0"/>
-              <a:t>Aim for high classification accuracies and micro-averaged F1 score</a:t>
-            </a:r>
-          </a:p>
-          <a:p>
-            <a:r>
-              <a:rPr lang="en-US" dirty="0"/>
-              <a:t>Test the hypothesis that the results will be similar or better than previous studies.</a:t>
-            </a:r>
-          </a:p>
-          <a:p>
-            <a:r>
-              <a:rPr lang="en-US" dirty="0"/>
-              <a:t>Ablation studies and architectural variations will be conducted, such as replacing the self-attention mechanism and shared weight matrix with other metrics or the encoding phase of an autoencoder.</a:t>
-            </a:r>
-            <a:endParaRPr lang="en-US" sz="2200" dirty="0"/>
-          </a:p>
-        </p:txBody>
-      </p:sp>
-      <p:sp>
-        <p:nvSpPr>
-          <p:cNvPr id="6" name="Slide Number Placeholder 5">
-            <a:extLst>
-              <a:ext uri="{FF2B5EF4-FFF2-40B4-BE49-F238E27FC236}">
-                <a16:creationId xmlns:a16="http://schemas.microsoft.com/office/drawing/2014/main" id="{A3E3E713-A070-42E3-60AF-E2F15FFACBEC}"/>
-              </a:ext>
-            </a:extLst>
-          </p:cNvPr>
-          <p:cNvSpPr>
-            <a:spLocks noGrp="1"/>
-          </p:cNvSpPr>
-          <p:nvPr>
-            <p:ph type="sldNum" sz="quarter" idx="12"/>
-          </p:nvPr>
-        </p:nvSpPr>
-        <p:spPr>
-          <a:xfrm>
-            <a:off x="11311128" y="6272784"/>
-            <a:ext cx="640080" cy="365125"/>
-          </a:xfrm>
-        </p:spPr>
-        <p:txBody>
-          <a:bodyPr>
-            <a:normAutofit/>
-          </a:bodyPr>
-          <a:lstStyle/>
-          <a:p>
-            <a:pPr>
-              <a:spcAft>
-                <a:spcPts val="600"/>
-              </a:spcAft>
-            </a:pPr>
-            <a:fld id="{D57F1E4F-1CFF-5643-939E-217C01CDF565}" type="slidenum">
-              <a:rPr lang="en-US" smtClean="0"/>
-              <a:pPr>
-                <a:spcAft>
-                  <a:spcPts val="600"/>
-                </a:spcAft>
-              </a:pPr>
-              <a:t>8</a:t>
-            </a:fld>
-            <a:endParaRPr lang="en-US"/>
-          </a:p>
-        </p:txBody>
-      </p:sp>
-      <p:pic>
-        <p:nvPicPr>
-          <p:cNvPr id="3" name="Picture 2" descr="Illuminated server room panel">
-            <a:extLst>
-              <a:ext uri="{FF2B5EF4-FFF2-40B4-BE49-F238E27FC236}">
-                <a16:creationId xmlns:a16="http://schemas.microsoft.com/office/drawing/2014/main" id="{BD85E323-E740-307F-E3DA-5159B4755561}"/>
-              </a:ext>
-            </a:extLst>
-          </p:cNvPr>
-          <p:cNvPicPr>
-            <a:picLocks noChangeAspect="1"/>
-          </p:cNvPicPr>
-          <p:nvPr/>
-        </p:nvPicPr>
-        <p:blipFill>
-          <a:blip r:embed="rId2"/>
-          <a:srcRect l="20157" r="20157"/>
-          <a:stretch/>
-        </p:blipFill>
-        <p:spPr>
-          <a:xfrm>
-            <a:off x="7872307" y="2193036"/>
-            <a:ext cx="3261974" cy="3639872"/>
-          </a:xfrm>
-          <a:prstGeom prst="rect">
-            <a:avLst/>
-          </a:prstGeom>
-        </p:spPr>
-      </p:pic>
-    </p:spTree>
-    <p:extLst>
-      <p:ext uri="{BB962C8B-B14F-4D97-AF65-F5344CB8AC3E}">
-        <p14:creationId xmlns:p14="http://schemas.microsoft.com/office/powerpoint/2010/main" val="2421100155"/>
-      </p:ext>
-    </p:extLst>
-  </p:cSld>
-  <p:clrMapOvr>
-    <a:masterClrMapping/>
-  </p:clrMapOvr>
-</p:sld>
-</file>
-
-<file path=ppt/slides/slide9.xml><?xml version="1.0" encoding="utf-8"?>
-<p:sld xmlns:a="http://schemas.openxmlformats.org/drawingml/2006/main" xmlns:r="http://schemas.openxmlformats.org/officeDocument/2006/relationships" xmlns:p="http://schemas.openxmlformats.org/presentationml/2006/main">
-  <p:cSld>
-    <p:spTree>
-      <p:nvGrpSpPr>
-        <p:cNvPr id="1" name=""/>
-        <p:cNvGrpSpPr/>
-        <p:nvPr/>
-      </p:nvGrpSpPr>
-      <p:grpSpPr>
-        <a:xfrm>
-          <a:off x="0" y="0"/>
-          <a:ext cx="0" cy="0"/>
-          <a:chOff x="0" y="0"/>
-          <a:chExt cx="0" cy="0"/>
-        </a:xfrm>
-      </p:grpSpPr>
-      <p:sp>
-        <p:nvSpPr>
-          <p:cNvPr id="2" name="Title 1">
-            <a:extLst>
-              <a:ext uri="{FF2B5EF4-FFF2-40B4-BE49-F238E27FC236}">
-                <a16:creationId xmlns:a16="http://schemas.microsoft.com/office/drawing/2014/main" id="{2166409C-8181-C8EB-4B9E-20A533ECA892}"/>
-              </a:ext>
-            </a:extLst>
-          </p:cNvPr>
-          <p:cNvSpPr>
-            <a:spLocks noGrp="1"/>
-          </p:cNvSpPr>
-          <p:nvPr>
-            <p:ph type="title"/>
-          </p:nvPr>
-        </p:nvSpPr>
-        <p:spPr>
-          <a:xfrm>
-            <a:off x="1069848" y="484632"/>
-            <a:ext cx="10058400" cy="1609344"/>
-          </a:xfrm>
-        </p:spPr>
-        <p:txBody>
-          <a:bodyPr>
-            <a:normAutofit/>
-          </a:bodyPr>
-          <a:lstStyle/>
-          <a:p>
-            <a:r>
-              <a:rPr lang="en-US" dirty="0"/>
-              <a:t>Reproducing &amp; experimenting GAT </a:t>
-            </a:r>
-            <a:br>
-              <a:rPr lang="en-US" dirty="0"/>
-            </a:br>
-            <a:r>
-              <a:rPr lang="en-US" dirty="0"/>
-              <a:t>- Methodology</a:t>
-            </a:r>
-          </a:p>
-        </p:txBody>
-      </p:sp>
-      <p:sp>
-        <p:nvSpPr>
-          <p:cNvPr id="42" name="Content Placeholder 2">
-            <a:extLst>
-              <a:ext uri="{FF2B5EF4-FFF2-40B4-BE49-F238E27FC236}">
-                <a16:creationId xmlns:a16="http://schemas.microsoft.com/office/drawing/2014/main" id="{1FD71070-A4EC-42D4-020D-ACA1B2467EA0}"/>
-              </a:ext>
-            </a:extLst>
-          </p:cNvPr>
-          <p:cNvSpPr>
-            <a:spLocks noGrp="1"/>
-          </p:cNvSpPr>
-          <p:nvPr>
-            <p:ph idx="1"/>
-          </p:nvPr>
-        </p:nvSpPr>
-        <p:spPr>
-          <a:xfrm>
-            <a:off x="1069847" y="2121408"/>
-            <a:ext cx="6482419" cy="4050792"/>
-          </a:xfrm>
-        </p:spPr>
-        <p:txBody>
-          <a:bodyPr>
-            <a:normAutofit/>
-          </a:bodyPr>
-          <a:lstStyle/>
-          <a:p>
-            <a:pPr>
-              <a:buFont typeface="Arial" panose="020B0604020202020204" pitchFamily="34" charset="0"/>
-              <a:buChar char="•"/>
-            </a:pPr>
-            <a:r>
-              <a:rPr lang="en-US" dirty="0"/>
-              <a:t>Datasets used in the original paper are publicly available, including in the Pytorch Geometric library</a:t>
-            </a:r>
-          </a:p>
-          <a:p>
-            <a:pPr>
-              <a:buFont typeface="Arial" panose="020B0604020202020204" pitchFamily="34" charset="0"/>
-              <a:buChar char="•"/>
-            </a:pPr>
-            <a:r>
-              <a:rPr lang="en-US" dirty="0"/>
-              <a:t>The datasets are relatively small, with the largest being 15.5MB when compressed.</a:t>
-            </a:r>
-          </a:p>
-          <a:p>
-            <a:pPr>
-              <a:buFont typeface="Arial" panose="020B0604020202020204" pitchFamily="34" charset="0"/>
-              <a:buChar char="•"/>
-            </a:pPr>
-            <a:r>
-              <a:rPr lang="en-US" dirty="0"/>
-              <a:t>Experiments are run locally and on Google </a:t>
-            </a:r>
-            <a:r>
-              <a:rPr lang="en-US" dirty="0" err="1"/>
-              <a:t>Colab</a:t>
-            </a:r>
-            <a:r>
-              <a:rPr lang="en-US" dirty="0"/>
-              <a:t>, providing sufficient computational resources.</a:t>
-            </a:r>
-          </a:p>
-          <a:p>
-            <a:pPr>
-              <a:buFont typeface="Arial" panose="020B0604020202020204" pitchFamily="34" charset="0"/>
-              <a:buChar char="•"/>
-            </a:pPr>
-            <a:r>
-              <a:rPr lang="en-US" dirty="0"/>
-              <a:t>The official GAT implementation was modified to suit the project's needs and to run model variants</a:t>
-            </a:r>
-          </a:p>
-          <a:p>
-            <a:pPr>
-              <a:buFont typeface="Arial" panose="020B0604020202020204" pitchFamily="34" charset="0"/>
-              <a:buChar char="•"/>
-            </a:pPr>
-            <a:r>
-              <a:rPr lang="en-US" dirty="0"/>
-              <a:t>The project aims to deepen understanding of GATs and contribute to ongoing research in the field.</a:t>
-            </a:r>
-            <a:endParaRPr lang="en-US" sz="2200" dirty="0"/>
-          </a:p>
-        </p:txBody>
-      </p:sp>
-      <p:sp>
-        <p:nvSpPr>
-          <p:cNvPr id="6" name="Slide Number Placeholder 5">
-            <a:extLst>
-              <a:ext uri="{FF2B5EF4-FFF2-40B4-BE49-F238E27FC236}">
-                <a16:creationId xmlns:a16="http://schemas.microsoft.com/office/drawing/2014/main" id="{A3E3E713-A070-42E3-60AF-E2F15FFACBEC}"/>
-              </a:ext>
-            </a:extLst>
-          </p:cNvPr>
-          <p:cNvSpPr>
-            <a:spLocks noGrp="1"/>
-          </p:cNvSpPr>
-          <p:nvPr>
-            <p:ph type="sldNum" sz="quarter" idx="12"/>
-          </p:nvPr>
-        </p:nvSpPr>
-        <p:spPr>
-          <a:xfrm>
-            <a:off x="11311128" y="6272784"/>
-            <a:ext cx="640080" cy="365125"/>
-          </a:xfrm>
-        </p:spPr>
-        <p:txBody>
-          <a:bodyPr>
-            <a:normAutofit/>
-          </a:bodyPr>
-          <a:lstStyle/>
-          <a:p>
-            <a:pPr>
-              <a:spcAft>
-                <a:spcPts val="600"/>
-              </a:spcAft>
-            </a:pPr>
-            <a:fld id="{D57F1E4F-1CFF-5643-939E-217C01CDF565}" type="slidenum">
-              <a:rPr lang="en-US" smtClean="0"/>
-              <a:pPr>
-                <a:spcAft>
-                  <a:spcPts val="600"/>
-                </a:spcAft>
-              </a:pPr>
-              <a:t>9</a:t>
-            </a:fld>
-            <a:endParaRPr lang="en-US"/>
-          </a:p>
-        </p:txBody>
-      </p:sp>
-      <p:pic>
-        <p:nvPicPr>
-          <p:cNvPr id="3" name="Picture 2" descr="Illuminated server room panel">
-            <a:extLst>
-              <a:ext uri="{FF2B5EF4-FFF2-40B4-BE49-F238E27FC236}">
-                <a16:creationId xmlns:a16="http://schemas.microsoft.com/office/drawing/2014/main" id="{BD85E323-E740-307F-E3DA-5159B4755561}"/>
-              </a:ext>
-            </a:extLst>
-          </p:cNvPr>
-          <p:cNvPicPr>
-            <a:picLocks noChangeAspect="1"/>
-          </p:cNvPicPr>
-          <p:nvPr/>
-        </p:nvPicPr>
-        <p:blipFill>
-          <a:blip r:embed="rId2"/>
-          <a:srcRect l="20157" r="20157"/>
-          <a:stretch/>
-        </p:blipFill>
-        <p:spPr>
-          <a:xfrm>
-            <a:off x="7872307" y="2193036"/>
-            <a:ext cx="3261974" cy="3639872"/>
-          </a:xfrm>
-          <a:prstGeom prst="rect">
-            <a:avLst/>
-          </a:prstGeom>
-        </p:spPr>
-      </p:pic>
-    </p:spTree>
-    <p:extLst>
-      <p:ext uri="{BB962C8B-B14F-4D97-AF65-F5344CB8AC3E}">
-        <p14:creationId xmlns:p14="http://schemas.microsoft.com/office/powerpoint/2010/main" val="1226571959"/>
+        <p14:creationId xmlns:p14="http://schemas.microsoft.com/office/powerpoint/2010/main" val="384789326"/>
       </p:ext>
     </p:extLst>
   </p:cSld>

</xml_diff>